<commit_message>
messed with grad presentation
</commit_message>
<xml_diff>
--- a/Presentation_Graduation.pptx
+++ b/Presentation_Graduation.pptx
@@ -13,7 +13,8 @@
     <p:sldId id="262" r:id="rId7"/>
     <p:sldId id="263" r:id="rId8"/>
     <p:sldId id="264" r:id="rId9"/>
-    <p:sldId id="260" r:id="rId10"/>
+    <p:sldId id="265" r:id="rId10"/>
+    <p:sldId id="260" r:id="rId11"/>
   </p:sldIdLst>
   <p:sldSz cx="12192000" cy="6858000"/>
   <p:notesSz cx="6858000" cy="9144000"/>
@@ -11099,1276 +11100,7 @@
 </p:sld>
 </file>
 
-<file path=ppt/slides/slide2.xml><?xml version="1.0" encoding="utf-8"?>
-<p:sld xmlns:a="http://schemas.openxmlformats.org/drawingml/2006/main" xmlns:r="http://schemas.openxmlformats.org/officeDocument/2006/relationships" xmlns:p="http://schemas.openxmlformats.org/presentationml/2006/main">
-  <p:cSld>
-    <p:bg>
-      <p:bgPr>
-        <a:solidFill>
-          <a:schemeClr val="bg1"/>
-        </a:solidFill>
-        <a:effectLst/>
-      </p:bgPr>
-    </p:bg>
-    <p:spTree>
-      <p:nvGrpSpPr>
-        <p:cNvPr id="1" name=""/>
-        <p:cNvGrpSpPr/>
-        <p:nvPr/>
-      </p:nvGrpSpPr>
-      <p:grpSpPr>
-        <a:xfrm>
-          <a:off x="0" y="0"/>
-          <a:ext cx="0" cy="0"/>
-          <a:chOff x="0" y="0"/>
-          <a:chExt cx="0" cy="0"/>
-        </a:xfrm>
-      </p:grpSpPr>
-      <p:sp useBgFill="1">
-        <p:nvSpPr>
-          <p:cNvPr id="9" name="Rectangle 8">
-            <a:extLst>
-              <a:ext uri="{FF2B5EF4-FFF2-40B4-BE49-F238E27FC236}">
-                <a16:creationId xmlns:a16="http://schemas.microsoft.com/office/drawing/2014/main" id="{53B021B3-DE93-4AB7-8A18-CF5F1CED88B8}"/>
-              </a:ext>
-              <a:ext uri="{C183D7F6-B498-43B3-948B-1728B52AA6E4}">
-                <adec:decorative xmlns:adec="http://schemas.microsoft.com/office/drawing/2017/decorative" val="1"/>
-              </a:ext>
-            </a:extLst>
-          </p:cNvPr>
-          <p:cNvSpPr>
-            <a:spLocks noGrp="1" noRot="1" noChangeAspect="1" noMove="1" noResize="1" noEditPoints="1" noAdjustHandles="1" noChangeArrowheads="1" noChangeShapeType="1" noTextEdit="1"/>
-          </p:cNvSpPr>
-          <p:nvPr>
-            <p:extLst>
-              <p:ext uri="{386F3935-93C4-4BCD-93E2-E3B085C9AB24}">
-                <p16:designElem xmlns:p16="http://schemas.microsoft.com/office/powerpoint/2015/main" val="1"/>
-              </p:ext>
-            </p:extLst>
-          </p:nvPr>
-        </p:nvSpPr>
-        <p:spPr>
-          <a:xfrm>
-            <a:off x="0" y="0"/>
-            <a:ext cx="12192000" cy="6858000"/>
-          </a:xfrm>
-          <a:prstGeom prst="rect">
-            <a:avLst/>
-          </a:prstGeom>
-          <a:ln>
-            <a:noFill/>
-          </a:ln>
-        </p:spPr>
-        <p:style>
-          <a:lnRef idx="2">
-            <a:schemeClr val="accent1">
-              <a:shade val="50000"/>
-            </a:schemeClr>
-          </a:lnRef>
-          <a:fillRef idx="1">
-            <a:schemeClr val="accent1"/>
-          </a:fillRef>
-          <a:effectRef idx="0">
-            <a:schemeClr val="accent1"/>
-          </a:effectRef>
-          <a:fontRef idx="minor">
-            <a:schemeClr val="lt1"/>
-          </a:fontRef>
-        </p:style>
-        <p:txBody>
-          <a:bodyPr rtlCol="0" anchor="ctr"/>
-          <a:lstStyle/>
-          <a:p>
-            <a:pPr algn="ctr"/>
-            <a:endParaRPr lang="en-US"/>
-          </a:p>
-        </p:txBody>
-      </p:sp>
-      <p:sp>
-        <p:nvSpPr>
-          <p:cNvPr id="2" name="Title 1">
-            <a:extLst>
-              <a:ext uri="{FF2B5EF4-FFF2-40B4-BE49-F238E27FC236}">
-                <a16:creationId xmlns:a16="http://schemas.microsoft.com/office/drawing/2014/main" id="{31EA2D66-EC00-4244-9281-50B8E4C71C74}"/>
-              </a:ext>
-            </a:extLst>
-          </p:cNvPr>
-          <p:cNvSpPr>
-            <a:spLocks noGrp="1"/>
-          </p:cNvSpPr>
-          <p:nvPr>
-            <p:ph type="title"/>
-          </p:nvPr>
-        </p:nvSpPr>
-        <p:spPr>
-          <a:xfrm>
-            <a:off x="841248" y="256032"/>
-            <a:ext cx="10506456" cy="1014984"/>
-          </a:xfrm>
-        </p:spPr>
-        <p:txBody>
-          <a:bodyPr anchor="b">
-            <a:normAutofit/>
-          </a:bodyPr>
-          <a:lstStyle/>
-          <a:p>
-            <a:r>
-              <a:rPr lang="en-US" dirty="0"/>
-              <a:t>Team Member</a:t>
-            </a:r>
-          </a:p>
-        </p:txBody>
-      </p:sp>
-      <p:sp>
-        <p:nvSpPr>
-          <p:cNvPr id="11" name="Rectangle 10">
-            <a:extLst>
-              <a:ext uri="{FF2B5EF4-FFF2-40B4-BE49-F238E27FC236}">
-                <a16:creationId xmlns:a16="http://schemas.microsoft.com/office/drawing/2014/main" id="{52D502E5-F6B4-4D58-B4AE-FC466FF15EE8}"/>
-              </a:ext>
-              <a:ext uri="{C183D7F6-B498-43B3-948B-1728B52AA6E4}">
-                <adec:decorative xmlns:adec="http://schemas.microsoft.com/office/drawing/2017/decorative" val="1"/>
-              </a:ext>
-            </a:extLst>
-          </p:cNvPr>
-          <p:cNvSpPr>
-            <a:spLocks noGrp="1" noRot="1" noChangeAspect="1" noMove="1" noResize="1" noEditPoints="1" noAdjustHandles="1" noChangeArrowheads="1" noChangeShapeType="1" noTextEdit="1"/>
-          </p:cNvSpPr>
-          <p:nvPr>
-            <p:extLst>
-              <p:ext uri="{386F3935-93C4-4BCD-93E2-E3B085C9AB24}">
-                <p16:designElem xmlns:p16="http://schemas.microsoft.com/office/powerpoint/2015/main" val="1"/>
-              </p:ext>
-            </p:extLst>
-          </p:nvPr>
-        </p:nvSpPr>
-        <p:spPr>
-          <a:xfrm>
-            <a:off x="865953" y="1634502"/>
-            <a:ext cx="10451592" cy="9144"/>
-          </a:xfrm>
-          <a:prstGeom prst="rect">
-            <a:avLst/>
-          </a:prstGeom>
-          <a:solidFill>
-            <a:schemeClr val="tx1">
-              <a:lumMod val="65000"/>
-              <a:lumOff val="35000"/>
-              <a:alpha val="30000"/>
-            </a:schemeClr>
-          </a:solidFill>
-          <a:ln w="9525">
-            <a:solidFill>
-              <a:schemeClr val="tx1">
-                <a:lumMod val="65000"/>
-                <a:lumOff val="35000"/>
-                <a:alpha val="30000"/>
-              </a:schemeClr>
-            </a:solidFill>
-          </a:ln>
-        </p:spPr>
-        <p:style>
-          <a:lnRef idx="2">
-            <a:schemeClr val="accent1">
-              <a:shade val="50000"/>
-            </a:schemeClr>
-          </a:lnRef>
-          <a:fillRef idx="1">
-            <a:schemeClr val="accent1"/>
-          </a:fillRef>
-          <a:effectRef idx="0">
-            <a:schemeClr val="accent1"/>
-          </a:effectRef>
-          <a:fontRef idx="minor">
-            <a:schemeClr val="lt1"/>
-          </a:fontRef>
-        </p:style>
-        <p:txBody>
-          <a:bodyPr rtlCol="0" anchor="ctr"/>
-          <a:lstStyle/>
-          <a:p>
-            <a:pPr marL="0" marR="0" lvl="0" indent="0" algn="ctr" defTabSz="914400" rtl="0" eaLnBrk="1" fontAlgn="auto" latinLnBrk="0" hangingPunct="1">
-              <a:lnSpc>
-                <a:spcPct val="100000"/>
-              </a:lnSpc>
-              <a:spcBef>
-                <a:spcPts val="0"/>
-              </a:spcBef>
-              <a:spcAft>
-                <a:spcPts val="0"/>
-              </a:spcAft>
-              <a:buClrTx/>
-              <a:buSzTx/>
-              <a:buFontTx/>
-              <a:buNone/>
-              <a:tabLst/>
-              <a:defRPr/>
-            </a:pPr>
-            <a:endParaRPr kumimoji="0" lang="en-US" sz="1800" b="0" i="0" u="none" strike="noStrike" kern="1200" cap="none" spc="0" normalizeH="0" baseline="0" noProof="0">
-              <a:ln>
-                <a:noFill/>
-              </a:ln>
-              <a:solidFill>
-                <a:prstClr val="white"/>
-              </a:solidFill>
-              <a:effectLst/>
-              <a:uLnTx/>
-              <a:uFillTx/>
-              <a:latin typeface="Calibri" panose="020F0502020204030204"/>
-              <a:ea typeface="+mn-ea"/>
-              <a:cs typeface="+mn-cs"/>
-            </a:endParaRPr>
-          </a:p>
-        </p:txBody>
-      </p:sp>
-      <p:sp>
-        <p:nvSpPr>
-          <p:cNvPr id="13" name="Rectangle 12">
-            <a:extLst>
-              <a:ext uri="{FF2B5EF4-FFF2-40B4-BE49-F238E27FC236}">
-                <a16:creationId xmlns:a16="http://schemas.microsoft.com/office/drawing/2014/main" id="{9DECDBF4-02B6-4BB4-B65B-B8107AD6A9E8}"/>
-              </a:ext>
-              <a:ext uri="{C183D7F6-B498-43B3-948B-1728B52AA6E4}">
-                <adec:decorative xmlns:adec="http://schemas.microsoft.com/office/drawing/2017/decorative" val="1"/>
-              </a:ext>
-            </a:extLst>
-          </p:cNvPr>
-          <p:cNvSpPr>
-            <a:spLocks noGrp="1" noRot="1" noChangeAspect="1" noMove="1" noResize="1" noEditPoints="1" noAdjustHandles="1" noChangeArrowheads="1" noChangeShapeType="1" noTextEdit="1"/>
-          </p:cNvSpPr>
-          <p:nvPr>
-            <p:extLst>
-              <p:ext uri="{386F3935-93C4-4BCD-93E2-E3B085C9AB24}">
-                <p16:designElem xmlns:p16="http://schemas.microsoft.com/office/powerpoint/2015/main" val="1"/>
-              </p:ext>
-            </p:extLst>
-          </p:nvPr>
-        </p:nvSpPr>
-        <p:spPr>
-          <a:xfrm flipV="1">
-            <a:off x="841248" y="1538176"/>
-            <a:ext cx="1873457" cy="109814"/>
-          </a:xfrm>
-          <a:prstGeom prst="rect">
-            <a:avLst/>
-          </a:prstGeom>
-          <a:solidFill>
-            <a:schemeClr val="accent1"/>
-          </a:solidFill>
-          <a:ln>
-            <a:noFill/>
-          </a:ln>
-        </p:spPr>
-        <p:style>
-          <a:lnRef idx="2">
-            <a:schemeClr val="accent1">
-              <a:shade val="50000"/>
-            </a:schemeClr>
-          </a:lnRef>
-          <a:fillRef idx="1">
-            <a:schemeClr val="accent1"/>
-          </a:fillRef>
-          <a:effectRef idx="0">
-            <a:schemeClr val="accent1"/>
-          </a:effectRef>
-          <a:fontRef idx="minor">
-            <a:schemeClr val="lt1"/>
-          </a:fontRef>
-        </p:style>
-        <p:txBody>
-          <a:bodyPr rtlCol="0" anchor="ctr"/>
-          <a:lstStyle/>
-          <a:p>
-            <a:pPr marL="0" marR="0" lvl="0" indent="0" algn="ctr" defTabSz="914400" rtl="0" eaLnBrk="1" fontAlgn="auto" latinLnBrk="0" hangingPunct="1">
-              <a:lnSpc>
-                <a:spcPct val="100000"/>
-              </a:lnSpc>
-              <a:spcBef>
-                <a:spcPts val="0"/>
-              </a:spcBef>
-              <a:spcAft>
-                <a:spcPts val="0"/>
-              </a:spcAft>
-              <a:buClrTx/>
-              <a:buSzTx/>
-              <a:buFontTx/>
-              <a:buNone/>
-              <a:tabLst/>
-              <a:defRPr/>
-            </a:pPr>
-            <a:endParaRPr kumimoji="0" lang="en-US" sz="1800" b="0" i="0" u="none" strike="noStrike" kern="1200" cap="none" spc="0" normalizeH="0" baseline="0" noProof="0">
-              <a:ln>
-                <a:noFill/>
-              </a:ln>
-              <a:solidFill>
-                <a:prstClr val="white"/>
-              </a:solidFill>
-              <a:effectLst/>
-              <a:uLnTx/>
-              <a:uFillTx/>
-              <a:latin typeface="Calibri" panose="020F0502020204030204"/>
-              <a:ea typeface="+mn-ea"/>
-              <a:cs typeface="+mn-cs"/>
-            </a:endParaRPr>
-          </a:p>
-        </p:txBody>
-      </p:sp>
-      <p:graphicFrame>
-        <p:nvGraphicFramePr>
-          <p:cNvPr id="5" name="Content Placeholder 2">
-            <a:extLst>
-              <a:ext uri="{FF2B5EF4-FFF2-40B4-BE49-F238E27FC236}">
-                <a16:creationId xmlns:a16="http://schemas.microsoft.com/office/drawing/2014/main" id="{85101980-6D81-43FF-8F0E-9E92506D6354}"/>
-              </a:ext>
-            </a:extLst>
-          </p:cNvPr>
-          <p:cNvGraphicFramePr>
-            <a:graphicFrameLocks noGrp="1"/>
-          </p:cNvGraphicFramePr>
-          <p:nvPr>
-            <p:ph idx="1"/>
-            <p:extLst>
-              <p:ext uri="{D42A27DB-BD31-4B8C-83A1-F6EECF244321}">
-                <p14:modId xmlns:p14="http://schemas.microsoft.com/office/powerpoint/2010/main" val="2251116711"/>
-              </p:ext>
-            </p:extLst>
-          </p:nvPr>
-        </p:nvGraphicFramePr>
-        <p:xfrm>
-          <a:off x="838200" y="1926266"/>
-          <a:ext cx="10515600" cy="4357524"/>
-        </p:xfrm>
-        <a:graphic>
-          <a:graphicData uri="http://schemas.openxmlformats.org/drawingml/2006/diagram">
-            <dgm:relIds xmlns:dgm="http://schemas.openxmlformats.org/drawingml/2006/diagram" xmlns:r="http://schemas.openxmlformats.org/officeDocument/2006/relationships" r:dm="rId2" r:lo="rId3" r:qs="rId4" r:cs="rId5"/>
-          </a:graphicData>
-        </a:graphic>
-      </p:graphicFrame>
-    </p:spTree>
-    <p:extLst>
-      <p:ext uri="{BB962C8B-B14F-4D97-AF65-F5344CB8AC3E}">
-        <p14:creationId xmlns:p14="http://schemas.microsoft.com/office/powerpoint/2010/main" val="1948973684"/>
-      </p:ext>
-    </p:extLst>
-  </p:cSld>
-  <p:clrMapOvr>
-    <a:masterClrMapping/>
-  </p:clrMapOvr>
-</p:sld>
-</file>
-
-<file path=ppt/slides/slide3.xml><?xml version="1.0" encoding="utf-8"?>
-<p:sld xmlns:a="http://schemas.openxmlformats.org/drawingml/2006/main" xmlns:r="http://schemas.openxmlformats.org/officeDocument/2006/relationships" xmlns:p="http://schemas.openxmlformats.org/presentationml/2006/main">
-  <p:cSld>
-    <p:bg>
-      <p:bgPr>
-        <a:solidFill>
-          <a:schemeClr val="bg1"/>
-        </a:solidFill>
-        <a:effectLst/>
-      </p:bgPr>
-    </p:bg>
-    <p:spTree>
-      <p:nvGrpSpPr>
-        <p:cNvPr id="1" name=""/>
-        <p:cNvGrpSpPr/>
-        <p:nvPr/>
-      </p:nvGrpSpPr>
-      <p:grpSpPr>
-        <a:xfrm>
-          <a:off x="0" y="0"/>
-          <a:ext cx="0" cy="0"/>
-          <a:chOff x="0" y="0"/>
-          <a:chExt cx="0" cy="0"/>
-        </a:xfrm>
-      </p:grpSpPr>
-      <p:sp useBgFill="1">
-        <p:nvSpPr>
-          <p:cNvPr id="9" name="Rectangle 8">
-            <a:extLst>
-              <a:ext uri="{FF2B5EF4-FFF2-40B4-BE49-F238E27FC236}">
-                <a16:creationId xmlns:a16="http://schemas.microsoft.com/office/drawing/2014/main" id="{53B021B3-DE93-4AB7-8A18-CF5F1CED88B8}"/>
-              </a:ext>
-              <a:ext uri="{C183D7F6-B498-43B3-948B-1728B52AA6E4}">
-                <adec:decorative xmlns:adec="http://schemas.microsoft.com/office/drawing/2017/decorative" val="1"/>
-              </a:ext>
-            </a:extLst>
-          </p:cNvPr>
-          <p:cNvSpPr>
-            <a:spLocks noGrp="1" noRot="1" noChangeAspect="1" noMove="1" noResize="1" noEditPoints="1" noAdjustHandles="1" noChangeArrowheads="1" noChangeShapeType="1" noTextEdit="1"/>
-          </p:cNvSpPr>
-          <p:nvPr>
-            <p:extLst>
-              <p:ext uri="{386F3935-93C4-4BCD-93E2-E3B085C9AB24}">
-                <p16:designElem xmlns:p16="http://schemas.microsoft.com/office/powerpoint/2015/main" val="1"/>
-              </p:ext>
-            </p:extLst>
-          </p:nvPr>
-        </p:nvSpPr>
-        <p:spPr>
-          <a:xfrm>
-            <a:off x="0" y="0"/>
-            <a:ext cx="12192000" cy="6858000"/>
-          </a:xfrm>
-          <a:prstGeom prst="rect">
-            <a:avLst/>
-          </a:prstGeom>
-          <a:ln>
-            <a:noFill/>
-          </a:ln>
-        </p:spPr>
-        <p:style>
-          <a:lnRef idx="2">
-            <a:schemeClr val="accent1">
-              <a:shade val="50000"/>
-            </a:schemeClr>
-          </a:lnRef>
-          <a:fillRef idx="1">
-            <a:schemeClr val="accent1"/>
-          </a:fillRef>
-          <a:effectRef idx="0">
-            <a:schemeClr val="accent1"/>
-          </a:effectRef>
-          <a:fontRef idx="minor">
-            <a:schemeClr val="lt1"/>
-          </a:fontRef>
-        </p:style>
-        <p:txBody>
-          <a:bodyPr rtlCol="0" anchor="ctr"/>
-          <a:lstStyle/>
-          <a:p>
-            <a:pPr algn="ctr"/>
-            <a:endParaRPr lang="en-US"/>
-          </a:p>
-        </p:txBody>
-      </p:sp>
-      <p:sp>
-        <p:nvSpPr>
-          <p:cNvPr id="2" name="Title 1">
-            <a:extLst>
-              <a:ext uri="{FF2B5EF4-FFF2-40B4-BE49-F238E27FC236}">
-                <a16:creationId xmlns:a16="http://schemas.microsoft.com/office/drawing/2014/main" id="{65FFEFC2-359F-8342-B1CB-A7341B85D38D}"/>
-              </a:ext>
-            </a:extLst>
-          </p:cNvPr>
-          <p:cNvSpPr>
-            <a:spLocks noGrp="1"/>
-          </p:cNvSpPr>
-          <p:nvPr>
-            <p:ph type="title"/>
-          </p:nvPr>
-        </p:nvSpPr>
-        <p:spPr>
-          <a:xfrm>
-            <a:off x="841248" y="256032"/>
-            <a:ext cx="10506456" cy="1014984"/>
-          </a:xfrm>
-        </p:spPr>
-        <p:txBody>
-          <a:bodyPr anchor="b">
-            <a:normAutofit/>
-          </a:bodyPr>
-          <a:lstStyle/>
-          <a:p>
-            <a:r>
-              <a:rPr lang="en-US" dirty="0"/>
-              <a:t>Over Review Of Functionality  </a:t>
-            </a:r>
-          </a:p>
-        </p:txBody>
-      </p:sp>
-      <p:sp>
-        <p:nvSpPr>
-          <p:cNvPr id="11" name="Rectangle 10">
-            <a:extLst>
-              <a:ext uri="{FF2B5EF4-FFF2-40B4-BE49-F238E27FC236}">
-                <a16:creationId xmlns:a16="http://schemas.microsoft.com/office/drawing/2014/main" id="{52D502E5-F6B4-4D58-B4AE-FC466FF15EE8}"/>
-              </a:ext>
-              <a:ext uri="{C183D7F6-B498-43B3-948B-1728B52AA6E4}">
-                <adec:decorative xmlns:adec="http://schemas.microsoft.com/office/drawing/2017/decorative" val="1"/>
-              </a:ext>
-            </a:extLst>
-          </p:cNvPr>
-          <p:cNvSpPr>
-            <a:spLocks noGrp="1" noRot="1" noChangeAspect="1" noMove="1" noResize="1" noEditPoints="1" noAdjustHandles="1" noChangeArrowheads="1" noChangeShapeType="1" noTextEdit="1"/>
-          </p:cNvSpPr>
-          <p:nvPr>
-            <p:extLst>
-              <p:ext uri="{386F3935-93C4-4BCD-93E2-E3B085C9AB24}">
-                <p16:designElem xmlns:p16="http://schemas.microsoft.com/office/powerpoint/2015/main" val="1"/>
-              </p:ext>
-            </p:extLst>
-          </p:nvPr>
-        </p:nvSpPr>
-        <p:spPr>
-          <a:xfrm>
-            <a:off x="865953" y="1634502"/>
-            <a:ext cx="10451592" cy="9144"/>
-          </a:xfrm>
-          <a:prstGeom prst="rect">
-            <a:avLst/>
-          </a:prstGeom>
-          <a:solidFill>
-            <a:schemeClr val="tx1">
-              <a:lumMod val="65000"/>
-              <a:lumOff val="35000"/>
-              <a:alpha val="30000"/>
-            </a:schemeClr>
-          </a:solidFill>
-          <a:ln w="9525">
-            <a:solidFill>
-              <a:schemeClr val="tx1">
-                <a:lumMod val="65000"/>
-                <a:lumOff val="35000"/>
-                <a:alpha val="30000"/>
-              </a:schemeClr>
-            </a:solidFill>
-          </a:ln>
-        </p:spPr>
-        <p:style>
-          <a:lnRef idx="2">
-            <a:schemeClr val="accent1">
-              <a:shade val="50000"/>
-            </a:schemeClr>
-          </a:lnRef>
-          <a:fillRef idx="1">
-            <a:schemeClr val="accent1"/>
-          </a:fillRef>
-          <a:effectRef idx="0">
-            <a:schemeClr val="accent1"/>
-          </a:effectRef>
-          <a:fontRef idx="minor">
-            <a:schemeClr val="lt1"/>
-          </a:fontRef>
-        </p:style>
-        <p:txBody>
-          <a:bodyPr rtlCol="0" anchor="ctr"/>
-          <a:lstStyle/>
-          <a:p>
-            <a:pPr marL="0" marR="0" lvl="0" indent="0" algn="ctr" defTabSz="914400" rtl="0" eaLnBrk="1" fontAlgn="auto" latinLnBrk="0" hangingPunct="1">
-              <a:lnSpc>
-                <a:spcPct val="100000"/>
-              </a:lnSpc>
-              <a:spcBef>
-                <a:spcPts val="0"/>
-              </a:spcBef>
-              <a:spcAft>
-                <a:spcPts val="0"/>
-              </a:spcAft>
-              <a:buClrTx/>
-              <a:buSzTx/>
-              <a:buFontTx/>
-              <a:buNone/>
-              <a:tabLst/>
-              <a:defRPr/>
-            </a:pPr>
-            <a:endParaRPr kumimoji="0" lang="en-US" sz="1800" b="0" i="0" u="none" strike="noStrike" kern="1200" cap="none" spc="0" normalizeH="0" baseline="0" noProof="0">
-              <a:ln>
-                <a:noFill/>
-              </a:ln>
-              <a:solidFill>
-                <a:prstClr val="white"/>
-              </a:solidFill>
-              <a:effectLst/>
-              <a:uLnTx/>
-              <a:uFillTx/>
-              <a:latin typeface="Calibri" panose="020F0502020204030204"/>
-              <a:ea typeface="+mn-ea"/>
-              <a:cs typeface="+mn-cs"/>
-            </a:endParaRPr>
-          </a:p>
-        </p:txBody>
-      </p:sp>
-      <p:sp>
-        <p:nvSpPr>
-          <p:cNvPr id="13" name="Rectangle 12">
-            <a:extLst>
-              <a:ext uri="{FF2B5EF4-FFF2-40B4-BE49-F238E27FC236}">
-                <a16:creationId xmlns:a16="http://schemas.microsoft.com/office/drawing/2014/main" id="{9DECDBF4-02B6-4BB4-B65B-B8107AD6A9E8}"/>
-              </a:ext>
-              <a:ext uri="{C183D7F6-B498-43B3-948B-1728B52AA6E4}">
-                <adec:decorative xmlns:adec="http://schemas.microsoft.com/office/drawing/2017/decorative" val="1"/>
-              </a:ext>
-            </a:extLst>
-          </p:cNvPr>
-          <p:cNvSpPr>
-            <a:spLocks noGrp="1" noRot="1" noChangeAspect="1" noMove="1" noResize="1" noEditPoints="1" noAdjustHandles="1" noChangeArrowheads="1" noChangeShapeType="1" noTextEdit="1"/>
-          </p:cNvSpPr>
-          <p:nvPr>
-            <p:extLst>
-              <p:ext uri="{386F3935-93C4-4BCD-93E2-E3B085C9AB24}">
-                <p16:designElem xmlns:p16="http://schemas.microsoft.com/office/powerpoint/2015/main" val="1"/>
-              </p:ext>
-            </p:extLst>
-          </p:nvPr>
-        </p:nvSpPr>
-        <p:spPr>
-          <a:xfrm flipV="1">
-            <a:off x="841248" y="1538176"/>
-            <a:ext cx="1873457" cy="109814"/>
-          </a:xfrm>
-          <a:prstGeom prst="rect">
-            <a:avLst/>
-          </a:prstGeom>
-          <a:solidFill>
-            <a:schemeClr val="accent1"/>
-          </a:solidFill>
-          <a:ln>
-            <a:noFill/>
-          </a:ln>
-        </p:spPr>
-        <p:style>
-          <a:lnRef idx="2">
-            <a:schemeClr val="accent1">
-              <a:shade val="50000"/>
-            </a:schemeClr>
-          </a:lnRef>
-          <a:fillRef idx="1">
-            <a:schemeClr val="accent1"/>
-          </a:fillRef>
-          <a:effectRef idx="0">
-            <a:schemeClr val="accent1"/>
-          </a:effectRef>
-          <a:fontRef idx="minor">
-            <a:schemeClr val="lt1"/>
-          </a:fontRef>
-        </p:style>
-        <p:txBody>
-          <a:bodyPr rtlCol="0" anchor="ctr"/>
-          <a:lstStyle/>
-          <a:p>
-            <a:pPr marL="0" marR="0" lvl="0" indent="0" algn="ctr" defTabSz="914400" rtl="0" eaLnBrk="1" fontAlgn="auto" latinLnBrk="0" hangingPunct="1">
-              <a:lnSpc>
-                <a:spcPct val="100000"/>
-              </a:lnSpc>
-              <a:spcBef>
-                <a:spcPts val="0"/>
-              </a:spcBef>
-              <a:spcAft>
-                <a:spcPts val="0"/>
-              </a:spcAft>
-              <a:buClrTx/>
-              <a:buSzTx/>
-              <a:buFontTx/>
-              <a:buNone/>
-              <a:tabLst/>
-              <a:defRPr/>
-            </a:pPr>
-            <a:endParaRPr kumimoji="0" lang="en-US" sz="1800" b="0" i="0" u="none" strike="noStrike" kern="1200" cap="none" spc="0" normalizeH="0" baseline="0" noProof="0">
-              <a:ln>
-                <a:noFill/>
-              </a:ln>
-              <a:solidFill>
-                <a:prstClr val="white"/>
-              </a:solidFill>
-              <a:effectLst/>
-              <a:uLnTx/>
-              <a:uFillTx/>
-              <a:latin typeface="Calibri" panose="020F0502020204030204"/>
-              <a:ea typeface="+mn-ea"/>
-              <a:cs typeface="+mn-cs"/>
-            </a:endParaRPr>
-          </a:p>
-        </p:txBody>
-      </p:sp>
-      <p:graphicFrame>
-        <p:nvGraphicFramePr>
-          <p:cNvPr id="5" name="Content Placeholder 2">
-            <a:extLst>
-              <a:ext uri="{FF2B5EF4-FFF2-40B4-BE49-F238E27FC236}">
-                <a16:creationId xmlns:a16="http://schemas.microsoft.com/office/drawing/2014/main" id="{76330727-47A6-4D2C-AA41-7D5AC79A07F0}"/>
-              </a:ext>
-            </a:extLst>
-          </p:cNvPr>
-          <p:cNvGraphicFramePr>
-            <a:graphicFrameLocks noGrp="1"/>
-          </p:cNvGraphicFramePr>
-          <p:nvPr>
-            <p:ph idx="1"/>
-            <p:extLst>
-              <p:ext uri="{D42A27DB-BD31-4B8C-83A1-F6EECF244321}">
-                <p14:modId xmlns:p14="http://schemas.microsoft.com/office/powerpoint/2010/main" val="622542960"/>
-              </p:ext>
-            </p:extLst>
-          </p:nvPr>
-        </p:nvGraphicFramePr>
-        <p:xfrm>
-          <a:off x="838200" y="1926266"/>
-          <a:ext cx="10515600" cy="4357524"/>
-        </p:xfrm>
-        <a:graphic>
-          <a:graphicData uri="http://schemas.openxmlformats.org/drawingml/2006/diagram">
-            <dgm:relIds xmlns:dgm="http://schemas.openxmlformats.org/drawingml/2006/diagram" xmlns:r="http://schemas.openxmlformats.org/officeDocument/2006/relationships" r:dm="rId2" r:lo="rId3" r:qs="rId4" r:cs="rId5"/>
-          </a:graphicData>
-        </a:graphic>
-      </p:graphicFrame>
-    </p:spTree>
-    <p:extLst>
-      <p:ext uri="{BB962C8B-B14F-4D97-AF65-F5344CB8AC3E}">
-        <p14:creationId xmlns:p14="http://schemas.microsoft.com/office/powerpoint/2010/main" val="2682412296"/>
-      </p:ext>
-    </p:extLst>
-  </p:cSld>
-  <p:clrMapOvr>
-    <a:masterClrMapping/>
-  </p:clrMapOvr>
-</p:sld>
-</file>
-
-<file path=ppt/slides/slide4.xml><?xml version="1.0" encoding="utf-8"?>
-<p:sld xmlns:a="http://schemas.openxmlformats.org/drawingml/2006/main" xmlns:r="http://schemas.openxmlformats.org/officeDocument/2006/relationships" xmlns:p="http://schemas.openxmlformats.org/presentationml/2006/main">
-  <p:cSld>
-    <p:spTree>
-      <p:nvGrpSpPr>
-        <p:cNvPr id="1" name=""/>
-        <p:cNvGrpSpPr/>
-        <p:nvPr/>
-      </p:nvGrpSpPr>
-      <p:grpSpPr>
-        <a:xfrm>
-          <a:off x="0" y="0"/>
-          <a:ext cx="0" cy="0"/>
-          <a:chOff x="0" y="0"/>
-          <a:chExt cx="0" cy="0"/>
-        </a:xfrm>
-      </p:grpSpPr>
-      <p:sp>
-        <p:nvSpPr>
-          <p:cNvPr id="2" name="Title 1">
-            <a:extLst>
-              <a:ext uri="{FF2B5EF4-FFF2-40B4-BE49-F238E27FC236}">
-                <a16:creationId xmlns:a16="http://schemas.microsoft.com/office/drawing/2014/main" id="{563827E9-D5A8-0B40-8B80-69D728693EFB}"/>
-              </a:ext>
-            </a:extLst>
-          </p:cNvPr>
-          <p:cNvSpPr>
-            <a:spLocks noGrp="1"/>
-          </p:cNvSpPr>
-          <p:nvPr>
-            <p:ph type="title"/>
-          </p:nvPr>
-        </p:nvSpPr>
-        <p:spPr/>
-        <p:txBody>
-          <a:bodyPr/>
-          <a:lstStyle/>
-          <a:p>
-            <a:r>
-              <a:rPr lang="en-US" dirty="0"/>
-              <a:t>Demo</a:t>
-            </a:r>
-          </a:p>
-        </p:txBody>
-      </p:sp>
-      <p:sp>
-        <p:nvSpPr>
-          <p:cNvPr id="3" name="Content Placeholder 2">
-            <a:extLst>
-              <a:ext uri="{FF2B5EF4-FFF2-40B4-BE49-F238E27FC236}">
-                <a16:creationId xmlns:a16="http://schemas.microsoft.com/office/drawing/2014/main" id="{08BAD7B9-77C4-8947-8BEC-6335E2AEC4DF}"/>
-              </a:ext>
-            </a:extLst>
-          </p:cNvPr>
-          <p:cNvSpPr>
-            <a:spLocks noGrp="1"/>
-          </p:cNvSpPr>
-          <p:nvPr>
-            <p:ph idx="1"/>
-          </p:nvPr>
-        </p:nvSpPr>
-        <p:spPr/>
-        <p:txBody>
-          <a:bodyPr/>
-          <a:lstStyle/>
-          <a:p>
-            <a:endParaRPr lang="en-US" dirty="0"/>
-          </a:p>
-        </p:txBody>
-      </p:sp>
-      <p:pic>
-        <p:nvPicPr>
-          <p:cNvPr id="5" name="Picture 4" descr="Graphical user interface, text, application, email&#10;&#10;Description automatically generated">
-            <a:extLst>
-              <a:ext uri="{FF2B5EF4-FFF2-40B4-BE49-F238E27FC236}">
-                <a16:creationId xmlns:a16="http://schemas.microsoft.com/office/drawing/2014/main" id="{CB62BC3D-D472-DF45-B475-F02BDAAD810E}"/>
-              </a:ext>
-            </a:extLst>
-          </p:cNvPr>
-          <p:cNvPicPr>
-            <a:picLocks noChangeAspect="1"/>
-          </p:cNvPicPr>
-          <p:nvPr/>
-        </p:nvPicPr>
-        <p:blipFill>
-          <a:blip r:embed="rId2"/>
-          <a:stretch>
-            <a:fillRect/>
-          </a:stretch>
-        </p:blipFill>
-        <p:spPr>
-          <a:xfrm>
-            <a:off x="100014" y="0"/>
-            <a:ext cx="11860380" cy="6858000"/>
-          </a:xfrm>
-          <a:prstGeom prst="rect">
-            <a:avLst/>
-          </a:prstGeom>
-        </p:spPr>
-      </p:pic>
-    </p:spTree>
-    <p:extLst>
-      <p:ext uri="{BB962C8B-B14F-4D97-AF65-F5344CB8AC3E}">
-        <p14:creationId xmlns:p14="http://schemas.microsoft.com/office/powerpoint/2010/main" val="996080349"/>
-      </p:ext>
-    </p:extLst>
-  </p:cSld>
-  <p:clrMapOvr>
-    <a:masterClrMapping/>
-  </p:clrMapOvr>
-</p:sld>
-</file>
-
-<file path=ppt/slides/slide5.xml><?xml version="1.0" encoding="utf-8"?>
-<p:sld xmlns:a="http://schemas.openxmlformats.org/drawingml/2006/main" xmlns:r="http://schemas.openxmlformats.org/officeDocument/2006/relationships" xmlns:p="http://schemas.openxmlformats.org/presentationml/2006/main">
-  <p:cSld>
-    <p:spTree>
-      <p:nvGrpSpPr>
-        <p:cNvPr id="1" name=""/>
-        <p:cNvGrpSpPr/>
-        <p:nvPr/>
-      </p:nvGrpSpPr>
-      <p:grpSpPr>
-        <a:xfrm>
-          <a:off x="0" y="0"/>
-          <a:ext cx="0" cy="0"/>
-          <a:chOff x="0" y="0"/>
-          <a:chExt cx="0" cy="0"/>
-        </a:xfrm>
-      </p:grpSpPr>
-      <p:sp>
-        <p:nvSpPr>
-          <p:cNvPr id="2" name="Title 1">
-            <a:extLst>
-              <a:ext uri="{FF2B5EF4-FFF2-40B4-BE49-F238E27FC236}">
-                <a16:creationId xmlns:a16="http://schemas.microsoft.com/office/drawing/2014/main" id="{1348B1E7-64E3-D240-8359-9CBB5BDA4128}"/>
-              </a:ext>
-            </a:extLst>
-          </p:cNvPr>
-          <p:cNvSpPr>
-            <a:spLocks noGrp="1"/>
-          </p:cNvSpPr>
-          <p:nvPr>
-            <p:ph type="title"/>
-          </p:nvPr>
-        </p:nvSpPr>
-        <p:spPr/>
-        <p:txBody>
-          <a:bodyPr/>
-          <a:lstStyle/>
-          <a:p>
-            <a:endParaRPr lang="en-US" dirty="0"/>
-          </a:p>
-        </p:txBody>
-      </p:sp>
-      <p:sp>
-        <p:nvSpPr>
-          <p:cNvPr id="3" name="Content Placeholder 2">
-            <a:extLst>
-              <a:ext uri="{FF2B5EF4-FFF2-40B4-BE49-F238E27FC236}">
-                <a16:creationId xmlns:a16="http://schemas.microsoft.com/office/drawing/2014/main" id="{1D2D1E12-C35D-964C-9EA9-E40089D7AEEB}"/>
-              </a:ext>
-            </a:extLst>
-          </p:cNvPr>
-          <p:cNvSpPr>
-            <a:spLocks noGrp="1"/>
-          </p:cNvSpPr>
-          <p:nvPr>
-            <p:ph idx="1"/>
-          </p:nvPr>
-        </p:nvSpPr>
-        <p:spPr/>
-        <p:txBody>
-          <a:bodyPr/>
-          <a:lstStyle/>
-          <a:p>
-            <a:endParaRPr lang="en-US" dirty="0"/>
-          </a:p>
-        </p:txBody>
-      </p:sp>
-      <p:pic>
-        <p:nvPicPr>
-          <p:cNvPr id="5" name="Picture 4" descr="Graphical user interface, application&#10;&#10;Description automatically generated">
-            <a:extLst>
-              <a:ext uri="{FF2B5EF4-FFF2-40B4-BE49-F238E27FC236}">
-                <a16:creationId xmlns:a16="http://schemas.microsoft.com/office/drawing/2014/main" id="{CF6881EA-2470-C04C-BD6A-42FE163F45DA}"/>
-              </a:ext>
-            </a:extLst>
-          </p:cNvPr>
-          <p:cNvPicPr>
-            <a:picLocks noChangeAspect="1"/>
-          </p:cNvPicPr>
-          <p:nvPr/>
-        </p:nvPicPr>
-        <p:blipFill>
-          <a:blip r:embed="rId2"/>
-          <a:stretch>
-            <a:fillRect/>
-          </a:stretch>
-        </p:blipFill>
-        <p:spPr>
-          <a:xfrm>
-            <a:off x="0" y="141070"/>
-            <a:ext cx="12192000" cy="6716930"/>
-          </a:xfrm>
-          <a:prstGeom prst="rect">
-            <a:avLst/>
-          </a:prstGeom>
-        </p:spPr>
-      </p:pic>
-    </p:spTree>
-    <p:extLst>
-      <p:ext uri="{BB962C8B-B14F-4D97-AF65-F5344CB8AC3E}">
-        <p14:creationId xmlns:p14="http://schemas.microsoft.com/office/powerpoint/2010/main" val="4222162642"/>
-      </p:ext>
-    </p:extLst>
-  </p:cSld>
-  <p:clrMapOvr>
-    <a:masterClrMapping/>
-  </p:clrMapOvr>
-</p:sld>
-</file>
-
-<file path=ppt/slides/slide6.xml><?xml version="1.0" encoding="utf-8"?>
-<p:sld xmlns:a="http://schemas.openxmlformats.org/drawingml/2006/main" xmlns:r="http://schemas.openxmlformats.org/officeDocument/2006/relationships" xmlns:p="http://schemas.openxmlformats.org/presentationml/2006/main">
-  <p:cSld>
-    <p:spTree>
-      <p:nvGrpSpPr>
-        <p:cNvPr id="1" name=""/>
-        <p:cNvGrpSpPr/>
-        <p:nvPr/>
-      </p:nvGrpSpPr>
-      <p:grpSpPr>
-        <a:xfrm>
-          <a:off x="0" y="0"/>
-          <a:ext cx="0" cy="0"/>
-          <a:chOff x="0" y="0"/>
-          <a:chExt cx="0" cy="0"/>
-        </a:xfrm>
-      </p:grpSpPr>
-      <p:sp>
-        <p:nvSpPr>
-          <p:cNvPr id="2" name="Title 1">
-            <a:extLst>
-              <a:ext uri="{FF2B5EF4-FFF2-40B4-BE49-F238E27FC236}">
-                <a16:creationId xmlns:a16="http://schemas.microsoft.com/office/drawing/2014/main" id="{620DB5C4-FFB9-374E-8AA2-43E53D6D93D8}"/>
-              </a:ext>
-            </a:extLst>
-          </p:cNvPr>
-          <p:cNvSpPr>
-            <a:spLocks noGrp="1"/>
-          </p:cNvSpPr>
-          <p:nvPr>
-            <p:ph type="title"/>
-          </p:nvPr>
-        </p:nvSpPr>
-        <p:spPr/>
-        <p:txBody>
-          <a:bodyPr/>
-          <a:lstStyle/>
-          <a:p>
-            <a:endParaRPr lang="en-US"/>
-          </a:p>
-        </p:txBody>
-      </p:sp>
-      <p:sp>
-        <p:nvSpPr>
-          <p:cNvPr id="3" name="Content Placeholder 2">
-            <a:extLst>
-              <a:ext uri="{FF2B5EF4-FFF2-40B4-BE49-F238E27FC236}">
-                <a16:creationId xmlns:a16="http://schemas.microsoft.com/office/drawing/2014/main" id="{DF0AA3EC-9CD3-324A-AA6A-7740435EBDBE}"/>
-              </a:ext>
-            </a:extLst>
-          </p:cNvPr>
-          <p:cNvSpPr>
-            <a:spLocks noGrp="1"/>
-          </p:cNvSpPr>
-          <p:nvPr>
-            <p:ph idx="1"/>
-          </p:nvPr>
-        </p:nvSpPr>
-        <p:spPr/>
-        <p:txBody>
-          <a:bodyPr/>
-          <a:lstStyle/>
-          <a:p>
-            <a:endParaRPr lang="en-US"/>
-          </a:p>
-        </p:txBody>
-      </p:sp>
-      <p:pic>
-        <p:nvPicPr>
-          <p:cNvPr id="5" name="Picture 4" descr="Graphical user interface, application&#10;&#10;Description automatically generated">
-            <a:extLst>
-              <a:ext uri="{FF2B5EF4-FFF2-40B4-BE49-F238E27FC236}">
-                <a16:creationId xmlns:a16="http://schemas.microsoft.com/office/drawing/2014/main" id="{74D7F1D7-B1D4-4043-B38F-721DB09FBDE7}"/>
-              </a:ext>
-            </a:extLst>
-          </p:cNvPr>
-          <p:cNvPicPr>
-            <a:picLocks noChangeAspect="1"/>
-          </p:cNvPicPr>
-          <p:nvPr/>
-        </p:nvPicPr>
-        <p:blipFill>
-          <a:blip r:embed="rId2"/>
-          <a:stretch>
-            <a:fillRect/>
-          </a:stretch>
-        </p:blipFill>
-        <p:spPr>
-          <a:xfrm>
-            <a:off x="0" y="141070"/>
-            <a:ext cx="12192000" cy="6575860"/>
-          </a:xfrm>
-          <a:prstGeom prst="rect">
-            <a:avLst/>
-          </a:prstGeom>
-        </p:spPr>
-      </p:pic>
-    </p:spTree>
-    <p:extLst>
-      <p:ext uri="{BB962C8B-B14F-4D97-AF65-F5344CB8AC3E}">
-        <p14:creationId xmlns:p14="http://schemas.microsoft.com/office/powerpoint/2010/main" val="2273346688"/>
-      </p:ext>
-    </p:extLst>
-  </p:cSld>
-  <p:clrMapOvr>
-    <a:masterClrMapping/>
-  </p:clrMapOvr>
-</p:sld>
-</file>
-
-<file path=ppt/slides/slide7.xml><?xml version="1.0" encoding="utf-8"?>
-<p:sld xmlns:a="http://schemas.openxmlformats.org/drawingml/2006/main" xmlns:r="http://schemas.openxmlformats.org/officeDocument/2006/relationships" xmlns:p="http://schemas.openxmlformats.org/presentationml/2006/main">
-  <p:cSld>
-    <p:spTree>
-      <p:nvGrpSpPr>
-        <p:cNvPr id="1" name=""/>
-        <p:cNvGrpSpPr/>
-        <p:nvPr/>
-      </p:nvGrpSpPr>
-      <p:grpSpPr>
-        <a:xfrm>
-          <a:off x="0" y="0"/>
-          <a:ext cx="0" cy="0"/>
-          <a:chOff x="0" y="0"/>
-          <a:chExt cx="0" cy="0"/>
-        </a:xfrm>
-      </p:grpSpPr>
-      <p:sp>
-        <p:nvSpPr>
-          <p:cNvPr id="2" name="Title 1">
-            <a:extLst>
-              <a:ext uri="{FF2B5EF4-FFF2-40B4-BE49-F238E27FC236}">
-                <a16:creationId xmlns:a16="http://schemas.microsoft.com/office/drawing/2014/main" id="{29621AD9-B852-974B-B9E6-AF236967B7BF}"/>
-              </a:ext>
-            </a:extLst>
-          </p:cNvPr>
-          <p:cNvSpPr>
-            <a:spLocks noGrp="1"/>
-          </p:cNvSpPr>
-          <p:nvPr>
-            <p:ph type="title"/>
-          </p:nvPr>
-        </p:nvSpPr>
-        <p:spPr/>
-        <p:txBody>
-          <a:bodyPr/>
-          <a:lstStyle/>
-          <a:p>
-            <a:endParaRPr lang="en-US"/>
-          </a:p>
-        </p:txBody>
-      </p:sp>
-      <p:sp>
-        <p:nvSpPr>
-          <p:cNvPr id="3" name="Content Placeholder 2">
-            <a:extLst>
-              <a:ext uri="{FF2B5EF4-FFF2-40B4-BE49-F238E27FC236}">
-                <a16:creationId xmlns:a16="http://schemas.microsoft.com/office/drawing/2014/main" id="{3AE3627F-DE5B-A346-9E2C-ADE3901A0ED1}"/>
-              </a:ext>
-            </a:extLst>
-          </p:cNvPr>
-          <p:cNvSpPr>
-            <a:spLocks noGrp="1"/>
-          </p:cNvSpPr>
-          <p:nvPr>
-            <p:ph idx="1"/>
-          </p:nvPr>
-        </p:nvSpPr>
-        <p:spPr/>
-        <p:txBody>
-          <a:bodyPr/>
-          <a:lstStyle/>
-          <a:p>
-            <a:endParaRPr lang="en-US" dirty="0"/>
-          </a:p>
-        </p:txBody>
-      </p:sp>
-      <p:pic>
-        <p:nvPicPr>
-          <p:cNvPr id="5" name="Picture 4" descr="Graphical user interface, text, application&#10;&#10;Description automatically generated">
-            <a:extLst>
-              <a:ext uri="{FF2B5EF4-FFF2-40B4-BE49-F238E27FC236}">
-                <a16:creationId xmlns:a16="http://schemas.microsoft.com/office/drawing/2014/main" id="{A529163C-3032-4A4A-84AC-35D003FE1B57}"/>
-              </a:ext>
-            </a:extLst>
-          </p:cNvPr>
-          <p:cNvPicPr>
-            <a:picLocks noChangeAspect="1"/>
-          </p:cNvPicPr>
-          <p:nvPr/>
-        </p:nvPicPr>
-        <p:blipFill>
-          <a:blip r:embed="rId2"/>
-          <a:stretch>
-            <a:fillRect/>
-          </a:stretch>
-        </p:blipFill>
-        <p:spPr>
-          <a:xfrm>
-            <a:off x="0" y="2118271"/>
-            <a:ext cx="12192000" cy="2621458"/>
-          </a:xfrm>
-          <a:prstGeom prst="rect">
-            <a:avLst/>
-          </a:prstGeom>
-        </p:spPr>
-      </p:pic>
-    </p:spTree>
-    <p:extLst>
-      <p:ext uri="{BB962C8B-B14F-4D97-AF65-F5344CB8AC3E}">
-        <p14:creationId xmlns:p14="http://schemas.microsoft.com/office/powerpoint/2010/main" val="800581944"/>
-      </p:ext>
-    </p:extLst>
-  </p:cSld>
-  <p:clrMapOvr>
-    <a:masterClrMapping/>
-  </p:clrMapOvr>
-</p:sld>
-</file>
-
-<file path=ppt/slides/slide8.xml><?xml version="1.0" encoding="utf-8"?>
-<p:sld xmlns:a="http://schemas.openxmlformats.org/drawingml/2006/main" xmlns:r="http://schemas.openxmlformats.org/officeDocument/2006/relationships" xmlns:p="http://schemas.openxmlformats.org/presentationml/2006/main">
-  <p:cSld>
-    <p:spTree>
-      <p:nvGrpSpPr>
-        <p:cNvPr id="1" name=""/>
-        <p:cNvGrpSpPr/>
-        <p:nvPr/>
-      </p:nvGrpSpPr>
-      <p:grpSpPr>
-        <a:xfrm>
-          <a:off x="0" y="0"/>
-          <a:ext cx="0" cy="0"/>
-          <a:chOff x="0" y="0"/>
-          <a:chExt cx="0" cy="0"/>
-        </a:xfrm>
-      </p:grpSpPr>
-      <p:sp>
-        <p:nvSpPr>
-          <p:cNvPr id="2" name="Title 1">
-            <a:extLst>
-              <a:ext uri="{FF2B5EF4-FFF2-40B4-BE49-F238E27FC236}">
-                <a16:creationId xmlns:a16="http://schemas.microsoft.com/office/drawing/2014/main" id="{D111E974-6F73-F640-BC8D-224E3A3CA886}"/>
-              </a:ext>
-            </a:extLst>
-          </p:cNvPr>
-          <p:cNvSpPr>
-            <a:spLocks noGrp="1"/>
-          </p:cNvSpPr>
-          <p:nvPr>
-            <p:ph type="title"/>
-          </p:nvPr>
-        </p:nvSpPr>
-        <p:spPr/>
-        <p:txBody>
-          <a:bodyPr/>
-          <a:lstStyle/>
-          <a:p>
-            <a:endParaRPr lang="en-US"/>
-          </a:p>
-        </p:txBody>
-      </p:sp>
-      <p:sp>
-        <p:nvSpPr>
-          <p:cNvPr id="3" name="Content Placeholder 2">
-            <a:extLst>
-              <a:ext uri="{FF2B5EF4-FFF2-40B4-BE49-F238E27FC236}">
-                <a16:creationId xmlns:a16="http://schemas.microsoft.com/office/drawing/2014/main" id="{79C09E98-E94E-EB47-977A-8890E4D13E52}"/>
-              </a:ext>
-            </a:extLst>
-          </p:cNvPr>
-          <p:cNvSpPr>
-            <a:spLocks noGrp="1"/>
-          </p:cNvSpPr>
-          <p:nvPr>
-            <p:ph idx="1"/>
-          </p:nvPr>
-        </p:nvSpPr>
-        <p:spPr/>
-        <p:txBody>
-          <a:bodyPr/>
-          <a:lstStyle/>
-          <a:p>
-            <a:endParaRPr lang="en-US"/>
-          </a:p>
-        </p:txBody>
-      </p:sp>
-      <p:pic>
-        <p:nvPicPr>
-          <p:cNvPr id="5" name="Picture 4" descr="Graphical user interface, text, application&#10;&#10;Description automatically generated">
-            <a:extLst>
-              <a:ext uri="{FF2B5EF4-FFF2-40B4-BE49-F238E27FC236}">
-                <a16:creationId xmlns:a16="http://schemas.microsoft.com/office/drawing/2014/main" id="{9E6542AE-E961-D046-89E8-B51111C79DF9}"/>
-              </a:ext>
-            </a:extLst>
-          </p:cNvPr>
-          <p:cNvPicPr>
-            <a:picLocks noChangeAspect="1"/>
-          </p:cNvPicPr>
-          <p:nvPr/>
-        </p:nvPicPr>
-        <p:blipFill>
-          <a:blip r:embed="rId2"/>
-          <a:stretch>
-            <a:fillRect/>
-          </a:stretch>
-        </p:blipFill>
-        <p:spPr>
-          <a:xfrm>
-            <a:off x="0" y="-1"/>
-            <a:ext cx="12192000" cy="6543675"/>
-          </a:xfrm>
-          <a:prstGeom prst="rect">
-            <a:avLst/>
-          </a:prstGeom>
-        </p:spPr>
-      </p:pic>
-    </p:spTree>
-    <p:extLst>
-      <p:ext uri="{BB962C8B-B14F-4D97-AF65-F5344CB8AC3E}">
-        <p14:creationId xmlns:p14="http://schemas.microsoft.com/office/powerpoint/2010/main" val="661580283"/>
-      </p:ext>
-    </p:extLst>
-  </p:cSld>
-  <p:clrMapOvr>
-    <a:masterClrMapping/>
-  </p:clrMapOvr>
-</p:sld>
-</file>
-
-<file path=ppt/slides/slide9.xml><?xml version="1.0" encoding="utf-8"?>
+<file path=ppt/slides/slide10.xml><?xml version="1.0" encoding="utf-8"?>
 <p:sld xmlns:a="http://schemas.openxmlformats.org/drawingml/2006/main" xmlns:r="http://schemas.openxmlformats.org/officeDocument/2006/relationships" xmlns:p="http://schemas.openxmlformats.org/presentationml/2006/main">
   <p:cSld>
     <p:bg>
@@ -13057,6 +11789,1358 @@
     <p:extLst>
       <p:ext uri="{BB962C8B-B14F-4D97-AF65-F5344CB8AC3E}">
         <p14:creationId xmlns:p14="http://schemas.microsoft.com/office/powerpoint/2010/main" val="589344"/>
+      </p:ext>
+    </p:extLst>
+  </p:cSld>
+  <p:clrMapOvr>
+    <a:masterClrMapping/>
+  </p:clrMapOvr>
+</p:sld>
+</file>
+
+<file path=ppt/slides/slide2.xml><?xml version="1.0" encoding="utf-8"?>
+<p:sld xmlns:a="http://schemas.openxmlformats.org/drawingml/2006/main" xmlns:r="http://schemas.openxmlformats.org/officeDocument/2006/relationships" xmlns:p="http://schemas.openxmlformats.org/presentationml/2006/main">
+  <p:cSld>
+    <p:bg>
+      <p:bgPr>
+        <a:solidFill>
+          <a:schemeClr val="bg1"/>
+        </a:solidFill>
+        <a:effectLst/>
+      </p:bgPr>
+    </p:bg>
+    <p:spTree>
+      <p:nvGrpSpPr>
+        <p:cNvPr id="1" name=""/>
+        <p:cNvGrpSpPr/>
+        <p:nvPr/>
+      </p:nvGrpSpPr>
+      <p:grpSpPr>
+        <a:xfrm>
+          <a:off x="0" y="0"/>
+          <a:ext cx="0" cy="0"/>
+          <a:chOff x="0" y="0"/>
+          <a:chExt cx="0" cy="0"/>
+        </a:xfrm>
+      </p:grpSpPr>
+      <p:sp useBgFill="1">
+        <p:nvSpPr>
+          <p:cNvPr id="9" name="Rectangle 8">
+            <a:extLst>
+              <a:ext uri="{FF2B5EF4-FFF2-40B4-BE49-F238E27FC236}">
+                <a16:creationId xmlns:a16="http://schemas.microsoft.com/office/drawing/2014/main" id="{53B021B3-DE93-4AB7-8A18-CF5F1CED88B8}"/>
+              </a:ext>
+              <a:ext uri="{C183D7F6-B498-43B3-948B-1728B52AA6E4}">
+                <adec:decorative xmlns:adec="http://schemas.microsoft.com/office/drawing/2017/decorative" val="1"/>
+              </a:ext>
+            </a:extLst>
+          </p:cNvPr>
+          <p:cNvSpPr>
+            <a:spLocks noGrp="1" noRot="1" noChangeAspect="1" noMove="1" noResize="1" noEditPoints="1" noAdjustHandles="1" noChangeArrowheads="1" noChangeShapeType="1" noTextEdit="1"/>
+          </p:cNvSpPr>
+          <p:nvPr>
+            <p:extLst>
+              <p:ext uri="{386F3935-93C4-4BCD-93E2-E3B085C9AB24}">
+                <p16:designElem xmlns:p16="http://schemas.microsoft.com/office/powerpoint/2015/main" val="1"/>
+              </p:ext>
+            </p:extLst>
+          </p:nvPr>
+        </p:nvSpPr>
+        <p:spPr>
+          <a:xfrm>
+            <a:off x="0" y="0"/>
+            <a:ext cx="12192000" cy="6858000"/>
+          </a:xfrm>
+          <a:prstGeom prst="rect">
+            <a:avLst/>
+          </a:prstGeom>
+          <a:ln>
+            <a:noFill/>
+          </a:ln>
+        </p:spPr>
+        <p:style>
+          <a:lnRef idx="2">
+            <a:schemeClr val="accent1">
+              <a:shade val="50000"/>
+            </a:schemeClr>
+          </a:lnRef>
+          <a:fillRef idx="1">
+            <a:schemeClr val="accent1"/>
+          </a:fillRef>
+          <a:effectRef idx="0">
+            <a:schemeClr val="accent1"/>
+          </a:effectRef>
+          <a:fontRef idx="minor">
+            <a:schemeClr val="lt1"/>
+          </a:fontRef>
+        </p:style>
+        <p:txBody>
+          <a:bodyPr rtlCol="0" anchor="ctr"/>
+          <a:lstStyle/>
+          <a:p>
+            <a:pPr algn="ctr"/>
+            <a:endParaRPr lang="en-US"/>
+          </a:p>
+        </p:txBody>
+      </p:sp>
+      <p:sp>
+        <p:nvSpPr>
+          <p:cNvPr id="2" name="Title 1">
+            <a:extLst>
+              <a:ext uri="{FF2B5EF4-FFF2-40B4-BE49-F238E27FC236}">
+                <a16:creationId xmlns:a16="http://schemas.microsoft.com/office/drawing/2014/main" id="{31EA2D66-EC00-4244-9281-50B8E4C71C74}"/>
+              </a:ext>
+            </a:extLst>
+          </p:cNvPr>
+          <p:cNvSpPr>
+            <a:spLocks noGrp="1"/>
+          </p:cNvSpPr>
+          <p:nvPr>
+            <p:ph type="title"/>
+          </p:nvPr>
+        </p:nvSpPr>
+        <p:spPr>
+          <a:xfrm>
+            <a:off x="841248" y="256032"/>
+            <a:ext cx="10506456" cy="1014984"/>
+          </a:xfrm>
+        </p:spPr>
+        <p:txBody>
+          <a:bodyPr anchor="b">
+            <a:normAutofit/>
+          </a:bodyPr>
+          <a:lstStyle/>
+          <a:p>
+            <a:r>
+              <a:rPr lang="en-US" dirty="0"/>
+              <a:t>Team Member</a:t>
+            </a:r>
+          </a:p>
+        </p:txBody>
+      </p:sp>
+      <p:sp>
+        <p:nvSpPr>
+          <p:cNvPr id="11" name="Rectangle 10">
+            <a:extLst>
+              <a:ext uri="{FF2B5EF4-FFF2-40B4-BE49-F238E27FC236}">
+                <a16:creationId xmlns:a16="http://schemas.microsoft.com/office/drawing/2014/main" id="{52D502E5-F6B4-4D58-B4AE-FC466FF15EE8}"/>
+              </a:ext>
+              <a:ext uri="{C183D7F6-B498-43B3-948B-1728B52AA6E4}">
+                <adec:decorative xmlns:adec="http://schemas.microsoft.com/office/drawing/2017/decorative" val="1"/>
+              </a:ext>
+            </a:extLst>
+          </p:cNvPr>
+          <p:cNvSpPr>
+            <a:spLocks noGrp="1" noRot="1" noChangeAspect="1" noMove="1" noResize="1" noEditPoints="1" noAdjustHandles="1" noChangeArrowheads="1" noChangeShapeType="1" noTextEdit="1"/>
+          </p:cNvSpPr>
+          <p:nvPr>
+            <p:extLst>
+              <p:ext uri="{386F3935-93C4-4BCD-93E2-E3B085C9AB24}">
+                <p16:designElem xmlns:p16="http://schemas.microsoft.com/office/powerpoint/2015/main" val="1"/>
+              </p:ext>
+            </p:extLst>
+          </p:nvPr>
+        </p:nvSpPr>
+        <p:spPr>
+          <a:xfrm>
+            <a:off x="865953" y="1634502"/>
+            <a:ext cx="10451592" cy="9144"/>
+          </a:xfrm>
+          <a:prstGeom prst="rect">
+            <a:avLst/>
+          </a:prstGeom>
+          <a:solidFill>
+            <a:schemeClr val="tx1">
+              <a:lumMod val="65000"/>
+              <a:lumOff val="35000"/>
+              <a:alpha val="30000"/>
+            </a:schemeClr>
+          </a:solidFill>
+          <a:ln w="9525">
+            <a:solidFill>
+              <a:schemeClr val="tx1">
+                <a:lumMod val="65000"/>
+                <a:lumOff val="35000"/>
+                <a:alpha val="30000"/>
+              </a:schemeClr>
+            </a:solidFill>
+          </a:ln>
+        </p:spPr>
+        <p:style>
+          <a:lnRef idx="2">
+            <a:schemeClr val="accent1">
+              <a:shade val="50000"/>
+            </a:schemeClr>
+          </a:lnRef>
+          <a:fillRef idx="1">
+            <a:schemeClr val="accent1"/>
+          </a:fillRef>
+          <a:effectRef idx="0">
+            <a:schemeClr val="accent1"/>
+          </a:effectRef>
+          <a:fontRef idx="minor">
+            <a:schemeClr val="lt1"/>
+          </a:fontRef>
+        </p:style>
+        <p:txBody>
+          <a:bodyPr rtlCol="0" anchor="ctr"/>
+          <a:lstStyle/>
+          <a:p>
+            <a:pPr marL="0" marR="0" lvl="0" indent="0" algn="ctr" defTabSz="914400" rtl="0" eaLnBrk="1" fontAlgn="auto" latinLnBrk="0" hangingPunct="1">
+              <a:lnSpc>
+                <a:spcPct val="100000"/>
+              </a:lnSpc>
+              <a:spcBef>
+                <a:spcPts val="0"/>
+              </a:spcBef>
+              <a:spcAft>
+                <a:spcPts val="0"/>
+              </a:spcAft>
+              <a:buClrTx/>
+              <a:buSzTx/>
+              <a:buFontTx/>
+              <a:buNone/>
+              <a:tabLst/>
+              <a:defRPr/>
+            </a:pPr>
+            <a:endParaRPr kumimoji="0" lang="en-US" sz="1800" b="0" i="0" u="none" strike="noStrike" kern="1200" cap="none" spc="0" normalizeH="0" baseline="0" noProof="0">
+              <a:ln>
+                <a:noFill/>
+              </a:ln>
+              <a:solidFill>
+                <a:prstClr val="white"/>
+              </a:solidFill>
+              <a:effectLst/>
+              <a:uLnTx/>
+              <a:uFillTx/>
+              <a:latin typeface="Calibri" panose="020F0502020204030204"/>
+              <a:ea typeface="+mn-ea"/>
+              <a:cs typeface="+mn-cs"/>
+            </a:endParaRPr>
+          </a:p>
+        </p:txBody>
+      </p:sp>
+      <p:sp>
+        <p:nvSpPr>
+          <p:cNvPr id="13" name="Rectangle 12">
+            <a:extLst>
+              <a:ext uri="{FF2B5EF4-FFF2-40B4-BE49-F238E27FC236}">
+                <a16:creationId xmlns:a16="http://schemas.microsoft.com/office/drawing/2014/main" id="{9DECDBF4-02B6-4BB4-B65B-B8107AD6A9E8}"/>
+              </a:ext>
+              <a:ext uri="{C183D7F6-B498-43B3-948B-1728B52AA6E4}">
+                <adec:decorative xmlns:adec="http://schemas.microsoft.com/office/drawing/2017/decorative" val="1"/>
+              </a:ext>
+            </a:extLst>
+          </p:cNvPr>
+          <p:cNvSpPr>
+            <a:spLocks noGrp="1" noRot="1" noChangeAspect="1" noMove="1" noResize="1" noEditPoints="1" noAdjustHandles="1" noChangeArrowheads="1" noChangeShapeType="1" noTextEdit="1"/>
+          </p:cNvSpPr>
+          <p:nvPr>
+            <p:extLst>
+              <p:ext uri="{386F3935-93C4-4BCD-93E2-E3B085C9AB24}">
+                <p16:designElem xmlns:p16="http://schemas.microsoft.com/office/powerpoint/2015/main" val="1"/>
+              </p:ext>
+            </p:extLst>
+          </p:nvPr>
+        </p:nvSpPr>
+        <p:spPr>
+          <a:xfrm flipV="1">
+            <a:off x="841248" y="1538176"/>
+            <a:ext cx="1873457" cy="109814"/>
+          </a:xfrm>
+          <a:prstGeom prst="rect">
+            <a:avLst/>
+          </a:prstGeom>
+          <a:solidFill>
+            <a:schemeClr val="accent1"/>
+          </a:solidFill>
+          <a:ln>
+            <a:noFill/>
+          </a:ln>
+        </p:spPr>
+        <p:style>
+          <a:lnRef idx="2">
+            <a:schemeClr val="accent1">
+              <a:shade val="50000"/>
+            </a:schemeClr>
+          </a:lnRef>
+          <a:fillRef idx="1">
+            <a:schemeClr val="accent1"/>
+          </a:fillRef>
+          <a:effectRef idx="0">
+            <a:schemeClr val="accent1"/>
+          </a:effectRef>
+          <a:fontRef idx="minor">
+            <a:schemeClr val="lt1"/>
+          </a:fontRef>
+        </p:style>
+        <p:txBody>
+          <a:bodyPr rtlCol="0" anchor="ctr"/>
+          <a:lstStyle/>
+          <a:p>
+            <a:pPr marL="0" marR="0" lvl="0" indent="0" algn="ctr" defTabSz="914400" rtl="0" eaLnBrk="1" fontAlgn="auto" latinLnBrk="0" hangingPunct="1">
+              <a:lnSpc>
+                <a:spcPct val="100000"/>
+              </a:lnSpc>
+              <a:spcBef>
+                <a:spcPts val="0"/>
+              </a:spcBef>
+              <a:spcAft>
+                <a:spcPts val="0"/>
+              </a:spcAft>
+              <a:buClrTx/>
+              <a:buSzTx/>
+              <a:buFontTx/>
+              <a:buNone/>
+              <a:tabLst/>
+              <a:defRPr/>
+            </a:pPr>
+            <a:endParaRPr kumimoji="0" lang="en-US" sz="1800" b="0" i="0" u="none" strike="noStrike" kern="1200" cap="none" spc="0" normalizeH="0" baseline="0" noProof="0">
+              <a:ln>
+                <a:noFill/>
+              </a:ln>
+              <a:solidFill>
+                <a:prstClr val="white"/>
+              </a:solidFill>
+              <a:effectLst/>
+              <a:uLnTx/>
+              <a:uFillTx/>
+              <a:latin typeface="Calibri" panose="020F0502020204030204"/>
+              <a:ea typeface="+mn-ea"/>
+              <a:cs typeface="+mn-cs"/>
+            </a:endParaRPr>
+          </a:p>
+        </p:txBody>
+      </p:sp>
+      <p:graphicFrame>
+        <p:nvGraphicFramePr>
+          <p:cNvPr id="5" name="Content Placeholder 2">
+            <a:extLst>
+              <a:ext uri="{FF2B5EF4-FFF2-40B4-BE49-F238E27FC236}">
+                <a16:creationId xmlns:a16="http://schemas.microsoft.com/office/drawing/2014/main" id="{85101980-6D81-43FF-8F0E-9E92506D6354}"/>
+              </a:ext>
+            </a:extLst>
+          </p:cNvPr>
+          <p:cNvGraphicFramePr>
+            <a:graphicFrameLocks noGrp="1"/>
+          </p:cNvGraphicFramePr>
+          <p:nvPr>
+            <p:ph idx="1"/>
+            <p:extLst>
+              <p:ext uri="{D42A27DB-BD31-4B8C-83A1-F6EECF244321}">
+                <p14:modId xmlns:p14="http://schemas.microsoft.com/office/powerpoint/2010/main" val="2251116711"/>
+              </p:ext>
+            </p:extLst>
+          </p:nvPr>
+        </p:nvGraphicFramePr>
+        <p:xfrm>
+          <a:off x="838200" y="1926266"/>
+          <a:ext cx="10515600" cy="4357524"/>
+        </p:xfrm>
+        <a:graphic>
+          <a:graphicData uri="http://schemas.openxmlformats.org/drawingml/2006/diagram">
+            <dgm:relIds xmlns:dgm="http://schemas.openxmlformats.org/drawingml/2006/diagram" xmlns:r="http://schemas.openxmlformats.org/officeDocument/2006/relationships" r:dm="rId2" r:lo="rId3" r:qs="rId4" r:cs="rId5"/>
+          </a:graphicData>
+        </a:graphic>
+      </p:graphicFrame>
+    </p:spTree>
+    <p:extLst>
+      <p:ext uri="{BB962C8B-B14F-4D97-AF65-F5344CB8AC3E}">
+        <p14:creationId xmlns:p14="http://schemas.microsoft.com/office/powerpoint/2010/main" val="1948973684"/>
+      </p:ext>
+    </p:extLst>
+  </p:cSld>
+  <p:clrMapOvr>
+    <a:masterClrMapping/>
+  </p:clrMapOvr>
+</p:sld>
+</file>
+
+<file path=ppt/slides/slide3.xml><?xml version="1.0" encoding="utf-8"?>
+<p:sld xmlns:a="http://schemas.openxmlformats.org/drawingml/2006/main" xmlns:r="http://schemas.openxmlformats.org/officeDocument/2006/relationships" xmlns:p="http://schemas.openxmlformats.org/presentationml/2006/main">
+  <p:cSld>
+    <p:bg>
+      <p:bgPr>
+        <a:solidFill>
+          <a:schemeClr val="bg1"/>
+        </a:solidFill>
+        <a:effectLst/>
+      </p:bgPr>
+    </p:bg>
+    <p:spTree>
+      <p:nvGrpSpPr>
+        <p:cNvPr id="1" name=""/>
+        <p:cNvGrpSpPr/>
+        <p:nvPr/>
+      </p:nvGrpSpPr>
+      <p:grpSpPr>
+        <a:xfrm>
+          <a:off x="0" y="0"/>
+          <a:ext cx="0" cy="0"/>
+          <a:chOff x="0" y="0"/>
+          <a:chExt cx="0" cy="0"/>
+        </a:xfrm>
+      </p:grpSpPr>
+      <p:sp useBgFill="1">
+        <p:nvSpPr>
+          <p:cNvPr id="9" name="Rectangle 8">
+            <a:extLst>
+              <a:ext uri="{FF2B5EF4-FFF2-40B4-BE49-F238E27FC236}">
+                <a16:creationId xmlns:a16="http://schemas.microsoft.com/office/drawing/2014/main" id="{53B021B3-DE93-4AB7-8A18-CF5F1CED88B8}"/>
+              </a:ext>
+              <a:ext uri="{C183D7F6-B498-43B3-948B-1728B52AA6E4}">
+                <adec:decorative xmlns:adec="http://schemas.microsoft.com/office/drawing/2017/decorative" val="1"/>
+              </a:ext>
+            </a:extLst>
+          </p:cNvPr>
+          <p:cNvSpPr>
+            <a:spLocks noGrp="1" noRot="1" noChangeAspect="1" noMove="1" noResize="1" noEditPoints="1" noAdjustHandles="1" noChangeArrowheads="1" noChangeShapeType="1" noTextEdit="1"/>
+          </p:cNvSpPr>
+          <p:nvPr>
+            <p:extLst>
+              <p:ext uri="{386F3935-93C4-4BCD-93E2-E3B085C9AB24}">
+                <p16:designElem xmlns:p16="http://schemas.microsoft.com/office/powerpoint/2015/main" val="1"/>
+              </p:ext>
+            </p:extLst>
+          </p:nvPr>
+        </p:nvSpPr>
+        <p:spPr>
+          <a:xfrm>
+            <a:off x="0" y="0"/>
+            <a:ext cx="12192000" cy="6858000"/>
+          </a:xfrm>
+          <a:prstGeom prst="rect">
+            <a:avLst/>
+          </a:prstGeom>
+          <a:ln>
+            <a:noFill/>
+          </a:ln>
+        </p:spPr>
+        <p:style>
+          <a:lnRef idx="2">
+            <a:schemeClr val="accent1">
+              <a:shade val="50000"/>
+            </a:schemeClr>
+          </a:lnRef>
+          <a:fillRef idx="1">
+            <a:schemeClr val="accent1"/>
+          </a:fillRef>
+          <a:effectRef idx="0">
+            <a:schemeClr val="accent1"/>
+          </a:effectRef>
+          <a:fontRef idx="minor">
+            <a:schemeClr val="lt1"/>
+          </a:fontRef>
+        </p:style>
+        <p:txBody>
+          <a:bodyPr rtlCol="0" anchor="ctr"/>
+          <a:lstStyle/>
+          <a:p>
+            <a:pPr algn="ctr"/>
+            <a:endParaRPr lang="en-US"/>
+          </a:p>
+        </p:txBody>
+      </p:sp>
+      <p:sp>
+        <p:nvSpPr>
+          <p:cNvPr id="2" name="Title 1">
+            <a:extLst>
+              <a:ext uri="{FF2B5EF4-FFF2-40B4-BE49-F238E27FC236}">
+                <a16:creationId xmlns:a16="http://schemas.microsoft.com/office/drawing/2014/main" id="{65FFEFC2-359F-8342-B1CB-A7341B85D38D}"/>
+              </a:ext>
+            </a:extLst>
+          </p:cNvPr>
+          <p:cNvSpPr>
+            <a:spLocks noGrp="1"/>
+          </p:cNvSpPr>
+          <p:nvPr>
+            <p:ph type="title"/>
+          </p:nvPr>
+        </p:nvSpPr>
+        <p:spPr>
+          <a:xfrm>
+            <a:off x="841248" y="256032"/>
+            <a:ext cx="10506456" cy="1014984"/>
+          </a:xfrm>
+        </p:spPr>
+        <p:txBody>
+          <a:bodyPr anchor="b">
+            <a:normAutofit/>
+          </a:bodyPr>
+          <a:lstStyle/>
+          <a:p>
+            <a:r>
+              <a:rPr lang="en-US" dirty="0"/>
+              <a:t>Over Review Of Functionality  </a:t>
+            </a:r>
+          </a:p>
+        </p:txBody>
+      </p:sp>
+      <p:sp>
+        <p:nvSpPr>
+          <p:cNvPr id="11" name="Rectangle 10">
+            <a:extLst>
+              <a:ext uri="{FF2B5EF4-FFF2-40B4-BE49-F238E27FC236}">
+                <a16:creationId xmlns:a16="http://schemas.microsoft.com/office/drawing/2014/main" id="{52D502E5-F6B4-4D58-B4AE-FC466FF15EE8}"/>
+              </a:ext>
+              <a:ext uri="{C183D7F6-B498-43B3-948B-1728B52AA6E4}">
+                <adec:decorative xmlns:adec="http://schemas.microsoft.com/office/drawing/2017/decorative" val="1"/>
+              </a:ext>
+            </a:extLst>
+          </p:cNvPr>
+          <p:cNvSpPr>
+            <a:spLocks noGrp="1" noRot="1" noChangeAspect="1" noMove="1" noResize="1" noEditPoints="1" noAdjustHandles="1" noChangeArrowheads="1" noChangeShapeType="1" noTextEdit="1"/>
+          </p:cNvSpPr>
+          <p:nvPr>
+            <p:extLst>
+              <p:ext uri="{386F3935-93C4-4BCD-93E2-E3B085C9AB24}">
+                <p16:designElem xmlns:p16="http://schemas.microsoft.com/office/powerpoint/2015/main" val="1"/>
+              </p:ext>
+            </p:extLst>
+          </p:nvPr>
+        </p:nvSpPr>
+        <p:spPr>
+          <a:xfrm>
+            <a:off x="865953" y="1634502"/>
+            <a:ext cx="10451592" cy="9144"/>
+          </a:xfrm>
+          <a:prstGeom prst="rect">
+            <a:avLst/>
+          </a:prstGeom>
+          <a:solidFill>
+            <a:schemeClr val="tx1">
+              <a:lumMod val="65000"/>
+              <a:lumOff val="35000"/>
+              <a:alpha val="30000"/>
+            </a:schemeClr>
+          </a:solidFill>
+          <a:ln w="9525">
+            <a:solidFill>
+              <a:schemeClr val="tx1">
+                <a:lumMod val="65000"/>
+                <a:lumOff val="35000"/>
+                <a:alpha val="30000"/>
+              </a:schemeClr>
+            </a:solidFill>
+          </a:ln>
+        </p:spPr>
+        <p:style>
+          <a:lnRef idx="2">
+            <a:schemeClr val="accent1">
+              <a:shade val="50000"/>
+            </a:schemeClr>
+          </a:lnRef>
+          <a:fillRef idx="1">
+            <a:schemeClr val="accent1"/>
+          </a:fillRef>
+          <a:effectRef idx="0">
+            <a:schemeClr val="accent1"/>
+          </a:effectRef>
+          <a:fontRef idx="minor">
+            <a:schemeClr val="lt1"/>
+          </a:fontRef>
+        </p:style>
+        <p:txBody>
+          <a:bodyPr rtlCol="0" anchor="ctr"/>
+          <a:lstStyle/>
+          <a:p>
+            <a:pPr marL="0" marR="0" lvl="0" indent="0" algn="ctr" defTabSz="914400" rtl="0" eaLnBrk="1" fontAlgn="auto" latinLnBrk="0" hangingPunct="1">
+              <a:lnSpc>
+                <a:spcPct val="100000"/>
+              </a:lnSpc>
+              <a:spcBef>
+                <a:spcPts val="0"/>
+              </a:spcBef>
+              <a:spcAft>
+                <a:spcPts val="0"/>
+              </a:spcAft>
+              <a:buClrTx/>
+              <a:buSzTx/>
+              <a:buFontTx/>
+              <a:buNone/>
+              <a:tabLst/>
+              <a:defRPr/>
+            </a:pPr>
+            <a:endParaRPr kumimoji="0" lang="en-US" sz="1800" b="0" i="0" u="none" strike="noStrike" kern="1200" cap="none" spc="0" normalizeH="0" baseline="0" noProof="0">
+              <a:ln>
+                <a:noFill/>
+              </a:ln>
+              <a:solidFill>
+                <a:prstClr val="white"/>
+              </a:solidFill>
+              <a:effectLst/>
+              <a:uLnTx/>
+              <a:uFillTx/>
+              <a:latin typeface="Calibri" panose="020F0502020204030204"/>
+              <a:ea typeface="+mn-ea"/>
+              <a:cs typeface="+mn-cs"/>
+            </a:endParaRPr>
+          </a:p>
+        </p:txBody>
+      </p:sp>
+      <p:sp>
+        <p:nvSpPr>
+          <p:cNvPr id="13" name="Rectangle 12">
+            <a:extLst>
+              <a:ext uri="{FF2B5EF4-FFF2-40B4-BE49-F238E27FC236}">
+                <a16:creationId xmlns:a16="http://schemas.microsoft.com/office/drawing/2014/main" id="{9DECDBF4-02B6-4BB4-B65B-B8107AD6A9E8}"/>
+              </a:ext>
+              <a:ext uri="{C183D7F6-B498-43B3-948B-1728B52AA6E4}">
+                <adec:decorative xmlns:adec="http://schemas.microsoft.com/office/drawing/2017/decorative" val="1"/>
+              </a:ext>
+            </a:extLst>
+          </p:cNvPr>
+          <p:cNvSpPr>
+            <a:spLocks noGrp="1" noRot="1" noChangeAspect="1" noMove="1" noResize="1" noEditPoints="1" noAdjustHandles="1" noChangeArrowheads="1" noChangeShapeType="1" noTextEdit="1"/>
+          </p:cNvSpPr>
+          <p:nvPr>
+            <p:extLst>
+              <p:ext uri="{386F3935-93C4-4BCD-93E2-E3B085C9AB24}">
+                <p16:designElem xmlns:p16="http://schemas.microsoft.com/office/powerpoint/2015/main" val="1"/>
+              </p:ext>
+            </p:extLst>
+          </p:nvPr>
+        </p:nvSpPr>
+        <p:spPr>
+          <a:xfrm flipV="1">
+            <a:off x="841248" y="1538176"/>
+            <a:ext cx="1873457" cy="109814"/>
+          </a:xfrm>
+          <a:prstGeom prst="rect">
+            <a:avLst/>
+          </a:prstGeom>
+          <a:solidFill>
+            <a:schemeClr val="accent1"/>
+          </a:solidFill>
+          <a:ln>
+            <a:noFill/>
+          </a:ln>
+        </p:spPr>
+        <p:style>
+          <a:lnRef idx="2">
+            <a:schemeClr val="accent1">
+              <a:shade val="50000"/>
+            </a:schemeClr>
+          </a:lnRef>
+          <a:fillRef idx="1">
+            <a:schemeClr val="accent1"/>
+          </a:fillRef>
+          <a:effectRef idx="0">
+            <a:schemeClr val="accent1"/>
+          </a:effectRef>
+          <a:fontRef idx="minor">
+            <a:schemeClr val="lt1"/>
+          </a:fontRef>
+        </p:style>
+        <p:txBody>
+          <a:bodyPr rtlCol="0" anchor="ctr"/>
+          <a:lstStyle/>
+          <a:p>
+            <a:pPr marL="0" marR="0" lvl="0" indent="0" algn="ctr" defTabSz="914400" rtl="0" eaLnBrk="1" fontAlgn="auto" latinLnBrk="0" hangingPunct="1">
+              <a:lnSpc>
+                <a:spcPct val="100000"/>
+              </a:lnSpc>
+              <a:spcBef>
+                <a:spcPts val="0"/>
+              </a:spcBef>
+              <a:spcAft>
+                <a:spcPts val="0"/>
+              </a:spcAft>
+              <a:buClrTx/>
+              <a:buSzTx/>
+              <a:buFontTx/>
+              <a:buNone/>
+              <a:tabLst/>
+              <a:defRPr/>
+            </a:pPr>
+            <a:endParaRPr kumimoji="0" lang="en-US" sz="1800" b="0" i="0" u="none" strike="noStrike" kern="1200" cap="none" spc="0" normalizeH="0" baseline="0" noProof="0">
+              <a:ln>
+                <a:noFill/>
+              </a:ln>
+              <a:solidFill>
+                <a:prstClr val="white"/>
+              </a:solidFill>
+              <a:effectLst/>
+              <a:uLnTx/>
+              <a:uFillTx/>
+              <a:latin typeface="Calibri" panose="020F0502020204030204"/>
+              <a:ea typeface="+mn-ea"/>
+              <a:cs typeface="+mn-cs"/>
+            </a:endParaRPr>
+          </a:p>
+        </p:txBody>
+      </p:sp>
+      <p:graphicFrame>
+        <p:nvGraphicFramePr>
+          <p:cNvPr id="5" name="Content Placeholder 2">
+            <a:extLst>
+              <a:ext uri="{FF2B5EF4-FFF2-40B4-BE49-F238E27FC236}">
+                <a16:creationId xmlns:a16="http://schemas.microsoft.com/office/drawing/2014/main" id="{76330727-47A6-4D2C-AA41-7D5AC79A07F0}"/>
+              </a:ext>
+            </a:extLst>
+          </p:cNvPr>
+          <p:cNvGraphicFramePr>
+            <a:graphicFrameLocks noGrp="1"/>
+          </p:cNvGraphicFramePr>
+          <p:nvPr>
+            <p:ph idx="1"/>
+            <p:extLst>
+              <p:ext uri="{D42A27DB-BD31-4B8C-83A1-F6EECF244321}">
+                <p14:modId xmlns:p14="http://schemas.microsoft.com/office/powerpoint/2010/main" val="622542960"/>
+              </p:ext>
+            </p:extLst>
+          </p:nvPr>
+        </p:nvGraphicFramePr>
+        <p:xfrm>
+          <a:off x="838200" y="1926266"/>
+          <a:ext cx="10515600" cy="4357524"/>
+        </p:xfrm>
+        <a:graphic>
+          <a:graphicData uri="http://schemas.openxmlformats.org/drawingml/2006/diagram">
+            <dgm:relIds xmlns:dgm="http://schemas.openxmlformats.org/drawingml/2006/diagram" xmlns:r="http://schemas.openxmlformats.org/officeDocument/2006/relationships" r:dm="rId2" r:lo="rId3" r:qs="rId4" r:cs="rId5"/>
+          </a:graphicData>
+        </a:graphic>
+      </p:graphicFrame>
+    </p:spTree>
+    <p:extLst>
+      <p:ext uri="{BB962C8B-B14F-4D97-AF65-F5344CB8AC3E}">
+        <p14:creationId xmlns:p14="http://schemas.microsoft.com/office/powerpoint/2010/main" val="2682412296"/>
+      </p:ext>
+    </p:extLst>
+  </p:cSld>
+  <p:clrMapOvr>
+    <a:masterClrMapping/>
+  </p:clrMapOvr>
+</p:sld>
+</file>
+
+<file path=ppt/slides/slide4.xml><?xml version="1.0" encoding="utf-8"?>
+<p:sld xmlns:a="http://schemas.openxmlformats.org/drawingml/2006/main" xmlns:r="http://schemas.openxmlformats.org/officeDocument/2006/relationships" xmlns:p="http://schemas.openxmlformats.org/presentationml/2006/main">
+  <p:cSld>
+    <p:spTree>
+      <p:nvGrpSpPr>
+        <p:cNvPr id="1" name=""/>
+        <p:cNvGrpSpPr/>
+        <p:nvPr/>
+      </p:nvGrpSpPr>
+      <p:grpSpPr>
+        <a:xfrm>
+          <a:off x="0" y="0"/>
+          <a:ext cx="0" cy="0"/>
+          <a:chOff x="0" y="0"/>
+          <a:chExt cx="0" cy="0"/>
+        </a:xfrm>
+      </p:grpSpPr>
+      <p:sp>
+        <p:nvSpPr>
+          <p:cNvPr id="2" name="Title 1">
+            <a:extLst>
+              <a:ext uri="{FF2B5EF4-FFF2-40B4-BE49-F238E27FC236}">
+                <a16:creationId xmlns:a16="http://schemas.microsoft.com/office/drawing/2014/main" id="{563827E9-D5A8-0B40-8B80-69D728693EFB}"/>
+              </a:ext>
+            </a:extLst>
+          </p:cNvPr>
+          <p:cNvSpPr>
+            <a:spLocks noGrp="1"/>
+          </p:cNvSpPr>
+          <p:nvPr>
+            <p:ph type="title"/>
+          </p:nvPr>
+        </p:nvSpPr>
+        <p:spPr/>
+        <p:txBody>
+          <a:bodyPr/>
+          <a:lstStyle/>
+          <a:p>
+            <a:r>
+              <a:rPr lang="en-US" dirty="0"/>
+              <a:t>Demo</a:t>
+            </a:r>
+          </a:p>
+        </p:txBody>
+      </p:sp>
+      <p:sp>
+        <p:nvSpPr>
+          <p:cNvPr id="3" name="Content Placeholder 2">
+            <a:extLst>
+              <a:ext uri="{FF2B5EF4-FFF2-40B4-BE49-F238E27FC236}">
+                <a16:creationId xmlns:a16="http://schemas.microsoft.com/office/drawing/2014/main" id="{08BAD7B9-77C4-8947-8BEC-6335E2AEC4DF}"/>
+              </a:ext>
+            </a:extLst>
+          </p:cNvPr>
+          <p:cNvSpPr>
+            <a:spLocks noGrp="1"/>
+          </p:cNvSpPr>
+          <p:nvPr>
+            <p:ph idx="1"/>
+          </p:nvPr>
+        </p:nvSpPr>
+        <p:spPr/>
+        <p:txBody>
+          <a:bodyPr/>
+          <a:lstStyle/>
+          <a:p>
+            <a:endParaRPr lang="en-US" dirty="0"/>
+          </a:p>
+        </p:txBody>
+      </p:sp>
+      <p:pic>
+        <p:nvPicPr>
+          <p:cNvPr id="5" name="Picture 4" descr="Graphical user interface, text, application, email&#10;&#10;Description automatically generated">
+            <a:extLst>
+              <a:ext uri="{FF2B5EF4-FFF2-40B4-BE49-F238E27FC236}">
+                <a16:creationId xmlns:a16="http://schemas.microsoft.com/office/drawing/2014/main" id="{CB62BC3D-D472-DF45-B475-F02BDAAD810E}"/>
+              </a:ext>
+            </a:extLst>
+          </p:cNvPr>
+          <p:cNvPicPr>
+            <a:picLocks noChangeAspect="1"/>
+          </p:cNvPicPr>
+          <p:nvPr/>
+        </p:nvPicPr>
+        <p:blipFill>
+          <a:blip r:embed="rId2"/>
+          <a:stretch>
+            <a:fillRect/>
+          </a:stretch>
+        </p:blipFill>
+        <p:spPr>
+          <a:xfrm>
+            <a:off x="100014" y="0"/>
+            <a:ext cx="11860380" cy="6858000"/>
+          </a:xfrm>
+          <a:prstGeom prst="rect">
+            <a:avLst/>
+          </a:prstGeom>
+        </p:spPr>
+      </p:pic>
+    </p:spTree>
+    <p:extLst>
+      <p:ext uri="{BB962C8B-B14F-4D97-AF65-F5344CB8AC3E}">
+        <p14:creationId xmlns:p14="http://schemas.microsoft.com/office/powerpoint/2010/main" val="996080349"/>
+      </p:ext>
+    </p:extLst>
+  </p:cSld>
+  <p:clrMapOvr>
+    <a:masterClrMapping/>
+  </p:clrMapOvr>
+</p:sld>
+</file>
+
+<file path=ppt/slides/slide5.xml><?xml version="1.0" encoding="utf-8"?>
+<p:sld xmlns:a="http://schemas.openxmlformats.org/drawingml/2006/main" xmlns:r="http://schemas.openxmlformats.org/officeDocument/2006/relationships" xmlns:p="http://schemas.openxmlformats.org/presentationml/2006/main">
+  <p:cSld>
+    <p:spTree>
+      <p:nvGrpSpPr>
+        <p:cNvPr id="1" name=""/>
+        <p:cNvGrpSpPr/>
+        <p:nvPr/>
+      </p:nvGrpSpPr>
+      <p:grpSpPr>
+        <a:xfrm>
+          <a:off x="0" y="0"/>
+          <a:ext cx="0" cy="0"/>
+          <a:chOff x="0" y="0"/>
+          <a:chExt cx="0" cy="0"/>
+        </a:xfrm>
+      </p:grpSpPr>
+      <p:sp>
+        <p:nvSpPr>
+          <p:cNvPr id="2" name="Title 1">
+            <a:extLst>
+              <a:ext uri="{FF2B5EF4-FFF2-40B4-BE49-F238E27FC236}">
+                <a16:creationId xmlns:a16="http://schemas.microsoft.com/office/drawing/2014/main" id="{1348B1E7-64E3-D240-8359-9CBB5BDA4128}"/>
+              </a:ext>
+            </a:extLst>
+          </p:cNvPr>
+          <p:cNvSpPr>
+            <a:spLocks noGrp="1"/>
+          </p:cNvSpPr>
+          <p:nvPr>
+            <p:ph type="title"/>
+          </p:nvPr>
+        </p:nvSpPr>
+        <p:spPr/>
+        <p:txBody>
+          <a:bodyPr/>
+          <a:lstStyle/>
+          <a:p>
+            <a:endParaRPr lang="en-US" dirty="0"/>
+          </a:p>
+        </p:txBody>
+      </p:sp>
+      <p:sp>
+        <p:nvSpPr>
+          <p:cNvPr id="3" name="Content Placeholder 2">
+            <a:extLst>
+              <a:ext uri="{FF2B5EF4-FFF2-40B4-BE49-F238E27FC236}">
+                <a16:creationId xmlns:a16="http://schemas.microsoft.com/office/drawing/2014/main" id="{1D2D1E12-C35D-964C-9EA9-E40089D7AEEB}"/>
+              </a:ext>
+            </a:extLst>
+          </p:cNvPr>
+          <p:cNvSpPr>
+            <a:spLocks noGrp="1"/>
+          </p:cNvSpPr>
+          <p:nvPr>
+            <p:ph idx="1"/>
+          </p:nvPr>
+        </p:nvSpPr>
+        <p:spPr/>
+        <p:txBody>
+          <a:bodyPr/>
+          <a:lstStyle/>
+          <a:p>
+            <a:endParaRPr lang="en-US" dirty="0"/>
+          </a:p>
+        </p:txBody>
+      </p:sp>
+      <p:pic>
+        <p:nvPicPr>
+          <p:cNvPr id="5" name="Picture 4" descr="Graphical user interface, application&#10;&#10;Description automatically generated">
+            <a:extLst>
+              <a:ext uri="{FF2B5EF4-FFF2-40B4-BE49-F238E27FC236}">
+                <a16:creationId xmlns:a16="http://schemas.microsoft.com/office/drawing/2014/main" id="{CF6881EA-2470-C04C-BD6A-42FE163F45DA}"/>
+              </a:ext>
+            </a:extLst>
+          </p:cNvPr>
+          <p:cNvPicPr>
+            <a:picLocks noChangeAspect="1"/>
+          </p:cNvPicPr>
+          <p:nvPr/>
+        </p:nvPicPr>
+        <p:blipFill>
+          <a:blip r:embed="rId2"/>
+          <a:stretch>
+            <a:fillRect/>
+          </a:stretch>
+        </p:blipFill>
+        <p:spPr>
+          <a:xfrm>
+            <a:off x="0" y="141070"/>
+            <a:ext cx="12192000" cy="6716930"/>
+          </a:xfrm>
+          <a:prstGeom prst="rect">
+            <a:avLst/>
+          </a:prstGeom>
+        </p:spPr>
+      </p:pic>
+    </p:spTree>
+    <p:extLst>
+      <p:ext uri="{BB962C8B-B14F-4D97-AF65-F5344CB8AC3E}">
+        <p14:creationId xmlns:p14="http://schemas.microsoft.com/office/powerpoint/2010/main" val="4222162642"/>
+      </p:ext>
+    </p:extLst>
+  </p:cSld>
+  <p:clrMapOvr>
+    <a:masterClrMapping/>
+  </p:clrMapOvr>
+</p:sld>
+</file>
+
+<file path=ppt/slides/slide6.xml><?xml version="1.0" encoding="utf-8"?>
+<p:sld xmlns:a="http://schemas.openxmlformats.org/drawingml/2006/main" xmlns:r="http://schemas.openxmlformats.org/officeDocument/2006/relationships" xmlns:p="http://schemas.openxmlformats.org/presentationml/2006/main">
+  <p:cSld>
+    <p:spTree>
+      <p:nvGrpSpPr>
+        <p:cNvPr id="1" name=""/>
+        <p:cNvGrpSpPr/>
+        <p:nvPr/>
+      </p:nvGrpSpPr>
+      <p:grpSpPr>
+        <a:xfrm>
+          <a:off x="0" y="0"/>
+          <a:ext cx="0" cy="0"/>
+          <a:chOff x="0" y="0"/>
+          <a:chExt cx="0" cy="0"/>
+        </a:xfrm>
+      </p:grpSpPr>
+      <p:sp>
+        <p:nvSpPr>
+          <p:cNvPr id="2" name="Title 1">
+            <a:extLst>
+              <a:ext uri="{FF2B5EF4-FFF2-40B4-BE49-F238E27FC236}">
+                <a16:creationId xmlns:a16="http://schemas.microsoft.com/office/drawing/2014/main" id="{620DB5C4-FFB9-374E-8AA2-43E53D6D93D8}"/>
+              </a:ext>
+            </a:extLst>
+          </p:cNvPr>
+          <p:cNvSpPr>
+            <a:spLocks noGrp="1"/>
+          </p:cNvSpPr>
+          <p:nvPr>
+            <p:ph type="title"/>
+          </p:nvPr>
+        </p:nvSpPr>
+        <p:spPr/>
+        <p:txBody>
+          <a:bodyPr/>
+          <a:lstStyle/>
+          <a:p>
+            <a:endParaRPr lang="en-US"/>
+          </a:p>
+        </p:txBody>
+      </p:sp>
+      <p:sp>
+        <p:nvSpPr>
+          <p:cNvPr id="3" name="Content Placeholder 2">
+            <a:extLst>
+              <a:ext uri="{FF2B5EF4-FFF2-40B4-BE49-F238E27FC236}">
+                <a16:creationId xmlns:a16="http://schemas.microsoft.com/office/drawing/2014/main" id="{DF0AA3EC-9CD3-324A-AA6A-7740435EBDBE}"/>
+              </a:ext>
+            </a:extLst>
+          </p:cNvPr>
+          <p:cNvSpPr>
+            <a:spLocks noGrp="1"/>
+          </p:cNvSpPr>
+          <p:nvPr>
+            <p:ph idx="1"/>
+          </p:nvPr>
+        </p:nvSpPr>
+        <p:spPr/>
+        <p:txBody>
+          <a:bodyPr/>
+          <a:lstStyle/>
+          <a:p>
+            <a:endParaRPr lang="en-US"/>
+          </a:p>
+        </p:txBody>
+      </p:sp>
+      <p:pic>
+        <p:nvPicPr>
+          <p:cNvPr id="5" name="Picture 4" descr="Graphical user interface, application&#10;&#10;Description automatically generated">
+            <a:extLst>
+              <a:ext uri="{FF2B5EF4-FFF2-40B4-BE49-F238E27FC236}">
+                <a16:creationId xmlns:a16="http://schemas.microsoft.com/office/drawing/2014/main" id="{74D7F1D7-B1D4-4043-B38F-721DB09FBDE7}"/>
+              </a:ext>
+            </a:extLst>
+          </p:cNvPr>
+          <p:cNvPicPr>
+            <a:picLocks noChangeAspect="1"/>
+          </p:cNvPicPr>
+          <p:nvPr/>
+        </p:nvPicPr>
+        <p:blipFill>
+          <a:blip r:embed="rId2"/>
+          <a:stretch>
+            <a:fillRect/>
+          </a:stretch>
+        </p:blipFill>
+        <p:spPr>
+          <a:xfrm>
+            <a:off x="0" y="141070"/>
+            <a:ext cx="12192000" cy="6575860"/>
+          </a:xfrm>
+          <a:prstGeom prst="rect">
+            <a:avLst/>
+          </a:prstGeom>
+        </p:spPr>
+      </p:pic>
+    </p:spTree>
+    <p:extLst>
+      <p:ext uri="{BB962C8B-B14F-4D97-AF65-F5344CB8AC3E}">
+        <p14:creationId xmlns:p14="http://schemas.microsoft.com/office/powerpoint/2010/main" val="2273346688"/>
+      </p:ext>
+    </p:extLst>
+  </p:cSld>
+  <p:clrMapOvr>
+    <a:masterClrMapping/>
+  </p:clrMapOvr>
+</p:sld>
+</file>
+
+<file path=ppt/slides/slide7.xml><?xml version="1.0" encoding="utf-8"?>
+<p:sld xmlns:a="http://schemas.openxmlformats.org/drawingml/2006/main" xmlns:r="http://schemas.openxmlformats.org/officeDocument/2006/relationships" xmlns:p="http://schemas.openxmlformats.org/presentationml/2006/main">
+  <p:cSld>
+    <p:spTree>
+      <p:nvGrpSpPr>
+        <p:cNvPr id="1" name=""/>
+        <p:cNvGrpSpPr/>
+        <p:nvPr/>
+      </p:nvGrpSpPr>
+      <p:grpSpPr>
+        <a:xfrm>
+          <a:off x="0" y="0"/>
+          <a:ext cx="0" cy="0"/>
+          <a:chOff x="0" y="0"/>
+          <a:chExt cx="0" cy="0"/>
+        </a:xfrm>
+      </p:grpSpPr>
+      <p:sp>
+        <p:nvSpPr>
+          <p:cNvPr id="2" name="Title 1">
+            <a:extLst>
+              <a:ext uri="{FF2B5EF4-FFF2-40B4-BE49-F238E27FC236}">
+                <a16:creationId xmlns:a16="http://schemas.microsoft.com/office/drawing/2014/main" id="{29621AD9-B852-974B-B9E6-AF236967B7BF}"/>
+              </a:ext>
+            </a:extLst>
+          </p:cNvPr>
+          <p:cNvSpPr>
+            <a:spLocks noGrp="1"/>
+          </p:cNvSpPr>
+          <p:nvPr>
+            <p:ph type="title"/>
+          </p:nvPr>
+        </p:nvSpPr>
+        <p:spPr/>
+        <p:txBody>
+          <a:bodyPr/>
+          <a:lstStyle/>
+          <a:p>
+            <a:endParaRPr lang="en-US"/>
+          </a:p>
+        </p:txBody>
+      </p:sp>
+      <p:sp>
+        <p:nvSpPr>
+          <p:cNvPr id="3" name="Content Placeholder 2">
+            <a:extLst>
+              <a:ext uri="{FF2B5EF4-FFF2-40B4-BE49-F238E27FC236}">
+                <a16:creationId xmlns:a16="http://schemas.microsoft.com/office/drawing/2014/main" id="{3AE3627F-DE5B-A346-9E2C-ADE3901A0ED1}"/>
+              </a:ext>
+            </a:extLst>
+          </p:cNvPr>
+          <p:cNvSpPr>
+            <a:spLocks noGrp="1"/>
+          </p:cNvSpPr>
+          <p:nvPr>
+            <p:ph idx="1"/>
+          </p:nvPr>
+        </p:nvSpPr>
+        <p:spPr/>
+        <p:txBody>
+          <a:bodyPr/>
+          <a:lstStyle/>
+          <a:p>
+            <a:endParaRPr lang="en-US" dirty="0"/>
+          </a:p>
+        </p:txBody>
+      </p:sp>
+      <p:pic>
+        <p:nvPicPr>
+          <p:cNvPr id="5" name="Picture 4" descr="Graphical user interface, text, application&#10;&#10;Description automatically generated">
+            <a:extLst>
+              <a:ext uri="{FF2B5EF4-FFF2-40B4-BE49-F238E27FC236}">
+                <a16:creationId xmlns:a16="http://schemas.microsoft.com/office/drawing/2014/main" id="{A529163C-3032-4A4A-84AC-35D003FE1B57}"/>
+              </a:ext>
+            </a:extLst>
+          </p:cNvPr>
+          <p:cNvPicPr>
+            <a:picLocks noChangeAspect="1"/>
+          </p:cNvPicPr>
+          <p:nvPr/>
+        </p:nvPicPr>
+        <p:blipFill>
+          <a:blip r:embed="rId2"/>
+          <a:stretch>
+            <a:fillRect/>
+          </a:stretch>
+        </p:blipFill>
+        <p:spPr>
+          <a:xfrm>
+            <a:off x="0" y="2118271"/>
+            <a:ext cx="12192000" cy="2621458"/>
+          </a:xfrm>
+          <a:prstGeom prst="rect">
+            <a:avLst/>
+          </a:prstGeom>
+        </p:spPr>
+      </p:pic>
+    </p:spTree>
+    <p:extLst>
+      <p:ext uri="{BB962C8B-B14F-4D97-AF65-F5344CB8AC3E}">
+        <p14:creationId xmlns:p14="http://schemas.microsoft.com/office/powerpoint/2010/main" val="800581944"/>
+      </p:ext>
+    </p:extLst>
+  </p:cSld>
+  <p:clrMapOvr>
+    <a:masterClrMapping/>
+  </p:clrMapOvr>
+</p:sld>
+</file>
+
+<file path=ppt/slides/slide8.xml><?xml version="1.0" encoding="utf-8"?>
+<p:sld xmlns:a="http://schemas.openxmlformats.org/drawingml/2006/main" xmlns:r="http://schemas.openxmlformats.org/officeDocument/2006/relationships" xmlns:p="http://schemas.openxmlformats.org/presentationml/2006/main">
+  <p:cSld>
+    <p:spTree>
+      <p:nvGrpSpPr>
+        <p:cNvPr id="1" name=""/>
+        <p:cNvGrpSpPr/>
+        <p:nvPr/>
+      </p:nvGrpSpPr>
+      <p:grpSpPr>
+        <a:xfrm>
+          <a:off x="0" y="0"/>
+          <a:ext cx="0" cy="0"/>
+          <a:chOff x="0" y="0"/>
+          <a:chExt cx="0" cy="0"/>
+        </a:xfrm>
+      </p:grpSpPr>
+      <p:sp>
+        <p:nvSpPr>
+          <p:cNvPr id="2" name="Title 1">
+            <a:extLst>
+              <a:ext uri="{FF2B5EF4-FFF2-40B4-BE49-F238E27FC236}">
+                <a16:creationId xmlns:a16="http://schemas.microsoft.com/office/drawing/2014/main" id="{D111E974-6F73-F640-BC8D-224E3A3CA886}"/>
+              </a:ext>
+            </a:extLst>
+          </p:cNvPr>
+          <p:cNvSpPr>
+            <a:spLocks noGrp="1"/>
+          </p:cNvSpPr>
+          <p:nvPr>
+            <p:ph type="title"/>
+          </p:nvPr>
+        </p:nvSpPr>
+        <p:spPr/>
+        <p:txBody>
+          <a:bodyPr/>
+          <a:lstStyle/>
+          <a:p>
+            <a:endParaRPr lang="en-US"/>
+          </a:p>
+        </p:txBody>
+      </p:sp>
+      <p:sp>
+        <p:nvSpPr>
+          <p:cNvPr id="3" name="Content Placeholder 2">
+            <a:extLst>
+              <a:ext uri="{FF2B5EF4-FFF2-40B4-BE49-F238E27FC236}">
+                <a16:creationId xmlns:a16="http://schemas.microsoft.com/office/drawing/2014/main" id="{79C09E98-E94E-EB47-977A-8890E4D13E52}"/>
+              </a:ext>
+            </a:extLst>
+          </p:cNvPr>
+          <p:cNvSpPr>
+            <a:spLocks noGrp="1"/>
+          </p:cNvSpPr>
+          <p:nvPr>
+            <p:ph idx="1"/>
+          </p:nvPr>
+        </p:nvSpPr>
+        <p:spPr/>
+        <p:txBody>
+          <a:bodyPr/>
+          <a:lstStyle/>
+          <a:p>
+            <a:endParaRPr lang="en-US"/>
+          </a:p>
+        </p:txBody>
+      </p:sp>
+      <p:pic>
+        <p:nvPicPr>
+          <p:cNvPr id="5" name="Picture 4" descr="Graphical user interface, text, application&#10;&#10;Description automatically generated">
+            <a:extLst>
+              <a:ext uri="{FF2B5EF4-FFF2-40B4-BE49-F238E27FC236}">
+                <a16:creationId xmlns:a16="http://schemas.microsoft.com/office/drawing/2014/main" id="{9E6542AE-E961-D046-89E8-B51111C79DF9}"/>
+              </a:ext>
+            </a:extLst>
+          </p:cNvPr>
+          <p:cNvPicPr>
+            <a:picLocks noChangeAspect="1"/>
+          </p:cNvPicPr>
+          <p:nvPr/>
+        </p:nvPicPr>
+        <p:blipFill>
+          <a:blip r:embed="rId2"/>
+          <a:stretch>
+            <a:fillRect/>
+          </a:stretch>
+        </p:blipFill>
+        <p:spPr>
+          <a:xfrm>
+            <a:off x="0" y="-1"/>
+            <a:ext cx="12192000" cy="6543675"/>
+          </a:xfrm>
+          <a:prstGeom prst="rect">
+            <a:avLst/>
+          </a:prstGeom>
+        </p:spPr>
+      </p:pic>
+    </p:spTree>
+    <p:extLst>
+      <p:ext uri="{BB962C8B-B14F-4D97-AF65-F5344CB8AC3E}">
+        <p14:creationId xmlns:p14="http://schemas.microsoft.com/office/powerpoint/2010/main" val="661580283"/>
+      </p:ext>
+    </p:extLst>
+  </p:cSld>
+  <p:clrMapOvr>
+    <a:masterClrMapping/>
+  </p:clrMapOvr>
+</p:sld>
+</file>
+
+<file path=ppt/slides/slide9.xml><?xml version="1.0" encoding="utf-8"?>
+<p:sld xmlns:a="http://schemas.openxmlformats.org/drawingml/2006/main" xmlns:r="http://schemas.openxmlformats.org/officeDocument/2006/relationships" xmlns:p="http://schemas.openxmlformats.org/presentationml/2006/main">
+  <p:cSld>
+    <p:spTree>
+      <p:nvGrpSpPr>
+        <p:cNvPr id="1" name=""/>
+        <p:cNvGrpSpPr/>
+        <p:nvPr/>
+      </p:nvGrpSpPr>
+      <p:grpSpPr>
+        <a:xfrm>
+          <a:off x="0" y="0"/>
+          <a:ext cx="0" cy="0"/>
+          <a:chOff x="0" y="0"/>
+          <a:chExt cx="0" cy="0"/>
+        </a:xfrm>
+      </p:grpSpPr>
+      <p:sp>
+        <p:nvSpPr>
+          <p:cNvPr id="2" name="Title 1">
+            <a:extLst>
+              <a:ext uri="{FF2B5EF4-FFF2-40B4-BE49-F238E27FC236}">
+                <a16:creationId xmlns:a16="http://schemas.microsoft.com/office/drawing/2014/main" id="{448A89BA-C4B9-4FF9-86C6-C241F666FA4B}"/>
+              </a:ext>
+            </a:extLst>
+          </p:cNvPr>
+          <p:cNvSpPr>
+            <a:spLocks noGrp="1"/>
+          </p:cNvSpPr>
+          <p:nvPr>
+            <p:ph type="title"/>
+          </p:nvPr>
+        </p:nvSpPr>
+        <p:spPr/>
+        <p:txBody>
+          <a:bodyPr/>
+          <a:lstStyle/>
+          <a:p>
+            <a:r>
+              <a:rPr lang="en-US" dirty="0"/>
+              <a:t>Challenges</a:t>
+            </a:r>
+          </a:p>
+        </p:txBody>
+      </p:sp>
+      <p:sp>
+        <p:nvSpPr>
+          <p:cNvPr id="3" name="Content Placeholder 2">
+            <a:extLst>
+              <a:ext uri="{FF2B5EF4-FFF2-40B4-BE49-F238E27FC236}">
+                <a16:creationId xmlns:a16="http://schemas.microsoft.com/office/drawing/2014/main" id="{9662F564-19B9-4AD3-9879-2C38FB14B1D3}"/>
+              </a:ext>
+            </a:extLst>
+          </p:cNvPr>
+          <p:cNvSpPr>
+            <a:spLocks noGrp="1"/>
+          </p:cNvSpPr>
+          <p:nvPr>
+            <p:ph idx="1"/>
+          </p:nvPr>
+        </p:nvSpPr>
+        <p:spPr/>
+        <p:txBody>
+          <a:bodyPr/>
+          <a:lstStyle/>
+          <a:p>
+            <a:endParaRPr lang="en-US" dirty="0"/>
+          </a:p>
+        </p:txBody>
+      </p:sp>
+    </p:spTree>
+    <p:extLst>
+      <p:ext uri="{BB962C8B-B14F-4D97-AF65-F5344CB8AC3E}">
+        <p14:creationId xmlns:p14="http://schemas.microsoft.com/office/powerpoint/2010/main" val="3737788077"/>
       </p:ext>
     </p:extLst>
   </p:cSld>

</xml_diff>